<commit_message>
lesson 4 -open file -save file
</commit_message>
<xml_diff>
--- a/doc/uiprogram.pptx
+++ b/doc/uiprogram.pptx
@@ -7,25 +7,39 @@
   <p:sldIdLst>
     <p:sldId id="275" r:id="rId2"/>
     <p:sldId id="276" r:id="rId3"/>
-    <p:sldId id="256" r:id="rId4"/>
-    <p:sldId id="257" r:id="rId5"/>
-    <p:sldId id="258" r:id="rId6"/>
-    <p:sldId id="259" r:id="rId7"/>
-    <p:sldId id="260" r:id="rId8"/>
-    <p:sldId id="261" r:id="rId9"/>
-    <p:sldId id="262" r:id="rId10"/>
-    <p:sldId id="263" r:id="rId11"/>
-    <p:sldId id="264" r:id="rId12"/>
-    <p:sldId id="265" r:id="rId13"/>
-    <p:sldId id="266" r:id="rId14"/>
-    <p:sldId id="267" r:id="rId15"/>
-    <p:sldId id="268" r:id="rId16"/>
-    <p:sldId id="269" r:id="rId17"/>
-    <p:sldId id="270" r:id="rId18"/>
-    <p:sldId id="271" r:id="rId19"/>
-    <p:sldId id="274" r:id="rId20"/>
-    <p:sldId id="272" r:id="rId21"/>
-    <p:sldId id="273" r:id="rId22"/>
+    <p:sldId id="277" r:id="rId4"/>
+    <p:sldId id="281" r:id="rId5"/>
+    <p:sldId id="278" r:id="rId6"/>
+    <p:sldId id="279" r:id="rId7"/>
+    <p:sldId id="280" r:id="rId8"/>
+    <p:sldId id="282" r:id="rId9"/>
+    <p:sldId id="283" r:id="rId10"/>
+    <p:sldId id="284" r:id="rId11"/>
+    <p:sldId id="285" r:id="rId12"/>
+    <p:sldId id="286" r:id="rId13"/>
+    <p:sldId id="287" r:id="rId14"/>
+    <p:sldId id="288" r:id="rId15"/>
+    <p:sldId id="289" r:id="rId16"/>
+    <p:sldId id="290" r:id="rId17"/>
+    <p:sldId id="256" r:id="rId18"/>
+    <p:sldId id="257" r:id="rId19"/>
+    <p:sldId id="258" r:id="rId20"/>
+    <p:sldId id="259" r:id="rId21"/>
+    <p:sldId id="260" r:id="rId22"/>
+    <p:sldId id="261" r:id="rId23"/>
+    <p:sldId id="262" r:id="rId24"/>
+    <p:sldId id="263" r:id="rId25"/>
+    <p:sldId id="264" r:id="rId26"/>
+    <p:sldId id="265" r:id="rId27"/>
+    <p:sldId id="266" r:id="rId28"/>
+    <p:sldId id="267" r:id="rId29"/>
+    <p:sldId id="268" r:id="rId30"/>
+    <p:sldId id="269" r:id="rId31"/>
+    <p:sldId id="270" r:id="rId32"/>
+    <p:sldId id="271" r:id="rId33"/>
+    <p:sldId id="274" r:id="rId34"/>
+    <p:sldId id="272" r:id="rId35"/>
+    <p:sldId id="273" r:id="rId36"/>
   </p:sldIdLst>
   <p:sldSz cx="9144000" cy="6858000" type="screen4x3"/>
   <p:notesSz cx="6858000" cy="9144000"/>
@@ -3342,7 +3356,7 @@
       </p:grpSpPr>
       <p:pic>
         <p:nvPicPr>
-          <p:cNvPr id="8194" name="Picture 2"/>
+          <p:cNvPr id="5123" name="Picture 3"/>
           <p:cNvPicPr>
             <a:picLocks noChangeAspect="1" noChangeArrowheads="1"/>
           </p:cNvPicPr>
@@ -3357,8 +3371,8 @@
         </p:blipFill>
         <p:spPr bwMode="auto">
           <a:xfrm>
-            <a:off x="1042988" y="333375"/>
-            <a:ext cx="4838700" cy="5057775"/>
+            <a:off x="2152650" y="885825"/>
+            <a:ext cx="4838700" cy="5086350"/>
           </a:xfrm>
           <a:prstGeom prst="rect">
             <a:avLst/>
@@ -3373,18 +3387,25 @@
           <a:effectLst/>
         </p:spPr>
       </p:pic>
-      <p:sp>
-        <p:nvSpPr>
-          <p:cNvPr id="8196" name="Text Box 4"/>
-          <p:cNvSpPr txBox="1">
-            <a:spLocks noChangeArrowheads="1"/>
-          </p:cNvSpPr>
+      <p:pic>
+        <p:nvPicPr>
+          <p:cNvPr id="5122" name="Picture 2"/>
+          <p:cNvPicPr>
+            <a:picLocks noChangeAspect="1" noChangeArrowheads="1"/>
+          </p:cNvPicPr>
           <p:nvPr/>
-        </p:nvSpPr>
+        </p:nvPicPr>
+        <p:blipFill>
+          <a:blip r:embed="rId3"/>
+          <a:srcRect/>
+          <a:stretch>
+            <a:fillRect/>
+          </a:stretch>
+        </p:blipFill>
         <p:spPr bwMode="auto">
           <a:xfrm>
-            <a:off x="323850" y="5949950"/>
-            <a:ext cx="7272338" cy="519113"/>
+            <a:off x="5500694" y="2000240"/>
+            <a:ext cx="1981200" cy="1276350"/>
           </a:xfrm>
           <a:prstGeom prst="rect">
             <a:avLst/>
@@ -3398,21 +3419,7 @@
           </a:ln>
           <a:effectLst/>
         </p:spPr>
-        <p:txBody>
-          <a:bodyPr>
-            <a:spAutoFit/>
-          </a:bodyPr>
-          <a:lstStyle/>
-          <a:p>
-            <a:pPr>
-              <a:spcBef>
-                <a:spcPct val="50000"/>
-              </a:spcBef>
-            </a:pPr>
-            <a:endParaRPr lang="th-TH"/>
-          </a:p>
-        </p:txBody>
-      </p:sp>
+      </p:pic>
     </p:spTree>
   </p:cSld>
   <p:clrMapOvr>
@@ -3440,7 +3447,7 @@
       </p:grpSpPr>
       <p:pic>
         <p:nvPicPr>
-          <p:cNvPr id="12292" name="Picture 4"/>
+          <p:cNvPr id="6146" name="Picture 2"/>
           <p:cNvPicPr>
             <a:picLocks noChangeAspect="1" noChangeArrowheads="1"/>
           </p:cNvPicPr>
@@ -3455,8 +3462,8 @@
         </p:blipFill>
         <p:spPr bwMode="auto">
           <a:xfrm>
-            <a:off x="1476375" y="333375"/>
-            <a:ext cx="4838700" cy="5057775"/>
+            <a:off x="2152650" y="885825"/>
+            <a:ext cx="4838700" cy="5086350"/>
           </a:xfrm>
           <a:prstGeom prst="rect">
             <a:avLst/>
@@ -3498,7 +3505,7 @@
       </p:grpSpPr>
       <p:pic>
         <p:nvPicPr>
-          <p:cNvPr id="13316" name="Picture 4"/>
+          <p:cNvPr id="7170" name="Picture 2"/>
           <p:cNvPicPr>
             <a:picLocks noChangeAspect="1" noChangeArrowheads="1"/>
           </p:cNvPicPr>
@@ -3513,8 +3520,8 @@
         </p:blipFill>
         <p:spPr bwMode="auto">
           <a:xfrm>
-            <a:off x="1042988" y="333375"/>
-            <a:ext cx="4838700" cy="5057775"/>
+            <a:off x="2152650" y="885825"/>
+            <a:ext cx="4838700" cy="5086350"/>
           </a:xfrm>
           <a:prstGeom prst="rect">
             <a:avLst/>
@@ -3529,228 +3536,6 @@
           <a:effectLst/>
         </p:spPr>
       </p:pic>
-      <p:pic>
-        <p:nvPicPr>
-          <p:cNvPr id="13314" name="Picture 2"/>
-          <p:cNvPicPr>
-            <a:picLocks noChangeAspect="1" noChangeArrowheads="1"/>
-          </p:cNvPicPr>
-          <p:nvPr/>
-        </p:nvPicPr>
-        <p:blipFill>
-          <a:blip r:embed="rId3"/>
-          <a:srcRect/>
-          <a:stretch>
-            <a:fillRect/>
-          </a:stretch>
-        </p:blipFill>
-        <p:spPr bwMode="auto">
-          <a:xfrm>
-            <a:off x="4859338" y="1125538"/>
-            <a:ext cx="1981200" cy="1276350"/>
-          </a:xfrm>
-          <a:prstGeom prst="rect">
-            <a:avLst/>
-          </a:prstGeom>
-          <a:noFill/>
-          <a:ln w="9525">
-            <a:noFill/>
-            <a:miter lim="800000"/>
-            <a:headEnd/>
-            <a:tailEnd/>
-          </a:ln>
-          <a:effectLst/>
-        </p:spPr>
-      </p:pic>
-      <p:sp>
-        <p:nvSpPr>
-          <p:cNvPr id="13318" name="Line 6"/>
-          <p:cNvSpPr>
-            <a:spLocks noChangeShapeType="1"/>
-          </p:cNvSpPr>
-          <p:nvPr/>
-        </p:nvSpPr>
-        <p:spPr bwMode="auto">
-          <a:xfrm>
-            <a:off x="5651500" y="1844675"/>
-            <a:ext cx="1873250" cy="0"/>
-          </a:xfrm>
-          <a:prstGeom prst="line">
-            <a:avLst/>
-          </a:prstGeom>
-          <a:noFill/>
-          <a:ln w="12700">
-            <a:solidFill>
-              <a:schemeClr val="tx1"/>
-            </a:solidFill>
-            <a:round/>
-            <a:headEnd/>
-            <a:tailEnd type="triangle" w="med" len="med"/>
-          </a:ln>
-          <a:effectLst/>
-        </p:spPr>
-        <p:txBody>
-          <a:bodyPr/>
-          <a:lstStyle/>
-          <a:p>
-            <a:endParaRPr lang="th-TH"/>
-          </a:p>
-        </p:txBody>
-      </p:sp>
-      <p:sp>
-        <p:nvSpPr>
-          <p:cNvPr id="13319" name="Text Box 7"/>
-          <p:cNvSpPr txBox="1">
-            <a:spLocks noChangeArrowheads="1"/>
-          </p:cNvSpPr>
-          <p:nvPr/>
-        </p:nvSpPr>
-        <p:spPr bwMode="auto">
-          <a:xfrm>
-            <a:off x="7596188" y="1557338"/>
-            <a:ext cx="1296987" cy="946150"/>
-          </a:xfrm>
-          <a:prstGeom prst="rect">
-            <a:avLst/>
-          </a:prstGeom>
-          <a:noFill/>
-          <a:ln w="9525">
-            <a:noFill/>
-            <a:miter lim="800000"/>
-            <a:headEnd/>
-            <a:tailEnd/>
-          </a:ln>
-          <a:effectLst/>
-        </p:spPr>
-        <p:txBody>
-          <a:bodyPr>
-            <a:spAutoFit/>
-          </a:bodyPr>
-          <a:lstStyle/>
-          <a:p>
-            <a:pPr>
-              <a:spcBef>
-                <a:spcPct val="50000"/>
-              </a:spcBef>
-            </a:pPr>
-            <a:r>
-              <a:rPr lang="th-TH"/>
-              <a:t>ระบุจุดเริ่มต้น</a:t>
-            </a:r>
-          </a:p>
-        </p:txBody>
-      </p:sp>
-      <p:pic>
-        <p:nvPicPr>
-          <p:cNvPr id="13320" name="Picture 8"/>
-          <p:cNvPicPr>
-            <a:picLocks noChangeAspect="1" noChangeArrowheads="1"/>
-          </p:cNvPicPr>
-          <p:nvPr/>
-        </p:nvPicPr>
-        <p:blipFill>
-          <a:blip r:embed="rId4"/>
-          <a:srcRect/>
-          <a:stretch>
-            <a:fillRect/>
-          </a:stretch>
-        </p:blipFill>
-        <p:spPr bwMode="auto">
-          <a:xfrm>
-            <a:off x="4859338" y="2924175"/>
-            <a:ext cx="1981200" cy="1276350"/>
-          </a:xfrm>
-          <a:prstGeom prst="rect">
-            <a:avLst/>
-          </a:prstGeom>
-          <a:noFill/>
-          <a:ln w="9525">
-            <a:noFill/>
-            <a:miter lim="800000"/>
-            <a:headEnd/>
-            <a:tailEnd/>
-          </a:ln>
-          <a:effectLst/>
-        </p:spPr>
-      </p:pic>
-      <p:sp>
-        <p:nvSpPr>
-          <p:cNvPr id="13321" name="Line 9"/>
-          <p:cNvSpPr>
-            <a:spLocks noChangeShapeType="1"/>
-          </p:cNvSpPr>
-          <p:nvPr/>
-        </p:nvSpPr>
-        <p:spPr bwMode="auto">
-          <a:xfrm>
-            <a:off x="5651500" y="3644900"/>
-            <a:ext cx="1873250" cy="0"/>
-          </a:xfrm>
-          <a:prstGeom prst="line">
-            <a:avLst/>
-          </a:prstGeom>
-          <a:noFill/>
-          <a:ln w="12700">
-            <a:solidFill>
-              <a:schemeClr val="tx1"/>
-            </a:solidFill>
-            <a:round/>
-            <a:headEnd/>
-            <a:tailEnd type="triangle" w="med" len="med"/>
-          </a:ln>
-          <a:effectLst/>
-        </p:spPr>
-        <p:txBody>
-          <a:bodyPr/>
-          <a:lstStyle/>
-          <a:p>
-            <a:endParaRPr lang="th-TH"/>
-          </a:p>
-        </p:txBody>
-      </p:sp>
-      <p:sp>
-        <p:nvSpPr>
-          <p:cNvPr id="13322" name="Text Box 10"/>
-          <p:cNvSpPr txBox="1">
-            <a:spLocks noChangeArrowheads="1"/>
-          </p:cNvSpPr>
-          <p:nvPr/>
-        </p:nvSpPr>
-        <p:spPr bwMode="auto">
-          <a:xfrm>
-            <a:off x="7524750" y="3357563"/>
-            <a:ext cx="1150938" cy="946150"/>
-          </a:xfrm>
-          <a:prstGeom prst="rect">
-            <a:avLst/>
-          </a:prstGeom>
-          <a:noFill/>
-          <a:ln w="9525">
-            <a:noFill/>
-            <a:miter lim="800000"/>
-            <a:headEnd/>
-            <a:tailEnd/>
-          </a:ln>
-          <a:effectLst/>
-        </p:spPr>
-        <p:txBody>
-          <a:bodyPr>
-            <a:spAutoFit/>
-          </a:bodyPr>
-          <a:lstStyle/>
-          <a:p>
-            <a:pPr>
-              <a:spcBef>
-                <a:spcPct val="50000"/>
-              </a:spcBef>
-            </a:pPr>
-            <a:r>
-              <a:rPr lang="th-TH"/>
-              <a:t>ระบุปลายทาง</a:t>
-            </a:r>
-          </a:p>
-        </p:txBody>
-      </p:sp>
     </p:spTree>
   </p:cSld>
   <p:clrMapOvr>
@@ -3778,7 +3563,7 @@
       </p:grpSpPr>
       <p:pic>
         <p:nvPicPr>
-          <p:cNvPr id="21506" name="Picture 2"/>
+          <p:cNvPr id="2" name="Picture 2"/>
           <p:cNvPicPr>
             <a:picLocks noChangeAspect="1" noChangeArrowheads="1"/>
           </p:cNvPicPr>
@@ -3793,8 +3578,8 @@
         </p:blipFill>
         <p:spPr bwMode="auto">
           <a:xfrm>
-            <a:off x="2051050" y="476250"/>
-            <a:ext cx="4838700" cy="5057775"/>
+            <a:off x="2152650" y="885825"/>
+            <a:ext cx="4838700" cy="5086350"/>
           </a:xfrm>
           <a:prstGeom prst="rect">
             <a:avLst/>
@@ -3809,18 +3594,25 @@
           <a:effectLst/>
         </p:spPr>
       </p:pic>
-      <p:sp>
-        <p:nvSpPr>
-          <p:cNvPr id="21511" name="Text Box 7"/>
-          <p:cNvSpPr txBox="1">
-            <a:spLocks noChangeArrowheads="1"/>
-          </p:cNvSpPr>
+      <p:pic>
+        <p:nvPicPr>
+          <p:cNvPr id="8194" name="Picture 2"/>
+          <p:cNvPicPr>
+            <a:picLocks noChangeAspect="1" noChangeArrowheads="1"/>
+          </p:cNvPicPr>
           <p:nvPr/>
-        </p:nvSpPr>
+        </p:nvPicPr>
+        <p:blipFill>
+          <a:blip r:embed="rId3"/>
+          <a:srcRect/>
+          <a:stretch>
+            <a:fillRect/>
+          </a:stretch>
+        </p:blipFill>
         <p:spPr bwMode="auto">
           <a:xfrm>
-            <a:off x="1116013" y="5805488"/>
-            <a:ext cx="6335712" cy="519112"/>
+            <a:off x="5429256" y="1500174"/>
+            <a:ext cx="1981200" cy="1276350"/>
           </a:xfrm>
           <a:prstGeom prst="rect">
             <a:avLst/>
@@ -3834,37 +3626,40 @@
           </a:ln>
           <a:effectLst/>
         </p:spPr>
-        <p:txBody>
-          <a:bodyPr>
-            <a:spAutoFit/>
-          </a:bodyPr>
-          <a:lstStyle/>
-          <a:p>
-            <a:pPr>
-              <a:spcBef>
-                <a:spcPct val="50000"/>
-              </a:spcBef>
-            </a:pPr>
-            <a:r>
-              <a:rPr lang="th-TH"/>
-              <a:t>ผลลัพท์จากการเพิ่ม </a:t>
-            </a:r>
-            <a:r>
-              <a:rPr lang="en-US"/>
-              <a:t>node </a:t>
-            </a:r>
-            <a:r>
-              <a:rPr lang="th-TH"/>
-              <a:t>และ </a:t>
-            </a:r>
-            <a:r>
-              <a:rPr lang="en-US"/>
-              <a:t>Edge</a:t>
-            </a:r>
-            <a:endParaRPr lang="th-TH"/>
-          </a:p>
-        </p:txBody>
-      </p:sp>
+      </p:pic>
+      <p:pic>
+        <p:nvPicPr>
+          <p:cNvPr id="8195" name="Picture 3"/>
+          <p:cNvPicPr>
+            <a:picLocks noChangeAspect="1" noChangeArrowheads="1"/>
+          </p:cNvPicPr>
+          <p:nvPr/>
+        </p:nvPicPr>
+        <p:blipFill>
+          <a:blip r:embed="rId4"/>
+          <a:srcRect/>
+          <a:stretch>
+            <a:fillRect/>
+          </a:stretch>
+        </p:blipFill>
+        <p:spPr bwMode="auto">
+          <a:xfrm>
+            <a:off x="5357818" y="3357562"/>
+            <a:ext cx="1981200" cy="1276350"/>
+          </a:xfrm>
+          <a:prstGeom prst="rect">
+            <a:avLst/>
+          </a:prstGeom>
+          <a:noFill/>
+          <a:ln w="9525">
+            <a:noFill/>
+            <a:miter lim="800000"/>
+            <a:headEnd/>
+            <a:tailEnd/>
+          </a:ln>
+          <a:effectLst/>
+        </p:spPr>
+      </p:pic>
     </p:spTree>
   </p:cSld>
   <p:clrMapOvr>
@@ -3890,65 +3685,9 @@
           <a:chExt cx="0" cy="0"/>
         </a:xfrm>
       </p:grpSpPr>
-      <p:sp>
-        <p:nvSpPr>
-          <p:cNvPr id="20482" name="Text Box 2"/>
-          <p:cNvSpPr txBox="1">
-            <a:spLocks noChangeArrowheads="1"/>
-          </p:cNvSpPr>
-          <p:nvPr/>
-        </p:nvSpPr>
-        <p:spPr bwMode="auto">
-          <a:xfrm>
-            <a:off x="1403350" y="404813"/>
-            <a:ext cx="5256213" cy="519112"/>
-          </a:xfrm>
-          <a:prstGeom prst="rect">
-            <a:avLst/>
-          </a:prstGeom>
-          <a:noFill/>
-          <a:ln w="9525">
-            <a:noFill/>
-            <a:miter lim="800000"/>
-            <a:headEnd/>
-            <a:tailEnd/>
-          </a:ln>
-          <a:effectLst/>
-        </p:spPr>
-        <p:txBody>
-          <a:bodyPr>
-            <a:spAutoFit/>
-          </a:bodyPr>
-          <a:lstStyle/>
-          <a:p>
-            <a:pPr>
-              <a:spcBef>
-                <a:spcPct val="50000"/>
-              </a:spcBef>
-            </a:pPr>
-            <a:r>
-              <a:rPr lang="th-TH"/>
-              <a:t>วิธีการลบ </a:t>
-            </a:r>
-            <a:r>
-              <a:rPr lang="en-US"/>
-              <a:t>Node </a:t>
-            </a:r>
-            <a:r>
-              <a:rPr lang="th-TH"/>
-              <a:t>และ </a:t>
-            </a:r>
-            <a:r>
-              <a:rPr lang="en-US"/>
-              <a:t>Edge</a:t>
-            </a:r>
-            <a:endParaRPr lang="th-TH"/>
-          </a:p>
-        </p:txBody>
-      </p:sp>
       <p:pic>
         <p:nvPicPr>
-          <p:cNvPr id="20483" name="Picture 3"/>
+          <p:cNvPr id="9218" name="Picture 2"/>
           <p:cNvPicPr>
             <a:picLocks noChangeAspect="1" noChangeArrowheads="1"/>
           </p:cNvPicPr>
@@ -3963,8 +3702,8 @@
         </p:blipFill>
         <p:spPr bwMode="auto">
           <a:xfrm>
-            <a:off x="2555875" y="1052513"/>
-            <a:ext cx="4838700" cy="5057775"/>
+            <a:off x="2152650" y="885825"/>
+            <a:ext cx="4838700" cy="5086350"/>
           </a:xfrm>
           <a:prstGeom prst="rect">
             <a:avLst/>
@@ -4006,7 +3745,7 @@
       </p:grpSpPr>
       <p:pic>
         <p:nvPicPr>
-          <p:cNvPr id="19460" name="Picture 4"/>
+          <p:cNvPr id="1026" name="Picture 2"/>
           <p:cNvPicPr>
             <a:picLocks noChangeAspect="1" noChangeArrowheads="1"/>
           </p:cNvPicPr>
@@ -4014,15 +3753,15 @@
         </p:nvPicPr>
         <p:blipFill>
           <a:blip r:embed="rId2"/>
-          <a:srcRect/>
+          <a:srcRect l="28208" t="28346" r="4600" b="18504"/>
           <a:stretch>
             <a:fillRect/>
           </a:stretch>
         </p:blipFill>
         <p:spPr bwMode="auto">
           <a:xfrm>
-            <a:off x="1042988" y="549275"/>
-            <a:ext cx="4838700" cy="5057775"/>
+            <a:off x="428596" y="857232"/>
+            <a:ext cx="5286412" cy="1928826"/>
           </a:xfrm>
           <a:prstGeom prst="rect">
             <a:avLst/>
@@ -4039,7 +3778,7 @@
       </p:pic>
       <p:pic>
         <p:nvPicPr>
-          <p:cNvPr id="19458" name="Picture 2"/>
+          <p:cNvPr id="1028" name="Picture 4"/>
           <p:cNvPicPr>
             <a:picLocks noChangeAspect="1" noChangeArrowheads="1"/>
           </p:cNvPicPr>
@@ -4047,15 +3786,15 @@
         </p:nvPicPr>
         <p:blipFill>
           <a:blip r:embed="rId3"/>
-          <a:srcRect/>
+          <a:srcRect l="26125" t="14844" r="3073" b="9517"/>
           <a:stretch>
             <a:fillRect/>
           </a:stretch>
         </p:blipFill>
         <p:spPr bwMode="auto">
           <a:xfrm>
-            <a:off x="4859338" y="1268413"/>
-            <a:ext cx="1981200" cy="1276350"/>
+            <a:off x="1928794" y="928670"/>
+            <a:ext cx="6143668" cy="5072098"/>
           </a:xfrm>
           <a:prstGeom prst="rect">
             <a:avLst/>
@@ -4097,7 +3836,7 @@
       </p:grpSpPr>
       <p:pic>
         <p:nvPicPr>
-          <p:cNvPr id="18434" name="Picture 2"/>
+          <p:cNvPr id="2050" name="Picture 2"/>
           <p:cNvPicPr>
             <a:picLocks noChangeAspect="1" noChangeArrowheads="1"/>
           </p:cNvPicPr>
@@ -4112,8 +3851,8 @@
         </p:blipFill>
         <p:spPr bwMode="auto">
           <a:xfrm>
-            <a:off x="2124075" y="404813"/>
-            <a:ext cx="4838700" cy="5057775"/>
+            <a:off x="2152650" y="885825"/>
+            <a:ext cx="4838700" cy="5086350"/>
           </a:xfrm>
           <a:prstGeom prst="rect">
             <a:avLst/>
@@ -4128,18 +3867,25 @@
           <a:effectLst/>
         </p:spPr>
       </p:pic>
-      <p:sp>
-        <p:nvSpPr>
-          <p:cNvPr id="18435" name="Text Box 3"/>
-          <p:cNvSpPr txBox="1">
-            <a:spLocks noChangeArrowheads="1"/>
-          </p:cNvSpPr>
+      <p:pic>
+        <p:nvPicPr>
+          <p:cNvPr id="2051" name="Picture 3"/>
+          <p:cNvPicPr>
+            <a:picLocks noChangeAspect="1" noChangeArrowheads="1"/>
+          </p:cNvPicPr>
           <p:nvPr/>
-        </p:nvSpPr>
+        </p:nvPicPr>
+        <p:blipFill>
+          <a:blip r:embed="rId3"/>
+          <a:srcRect/>
+          <a:stretch>
+            <a:fillRect/>
+          </a:stretch>
+        </p:blipFill>
         <p:spPr bwMode="auto">
           <a:xfrm>
-            <a:off x="684213" y="5805488"/>
-            <a:ext cx="5616575" cy="519112"/>
+            <a:off x="2152650" y="885825"/>
+            <a:ext cx="4838700" cy="5086350"/>
           </a:xfrm>
           <a:prstGeom prst="rect">
             <a:avLst/>
@@ -4153,37 +3899,7 @@
           </a:ln>
           <a:effectLst/>
         </p:spPr>
-        <p:txBody>
-          <a:bodyPr>
-            <a:spAutoFit/>
-          </a:bodyPr>
-          <a:lstStyle/>
-          <a:p>
-            <a:pPr>
-              <a:spcBef>
-                <a:spcPct val="50000"/>
-              </a:spcBef>
-            </a:pPr>
-            <a:r>
-              <a:rPr lang="th-TH"/>
-              <a:t>ผลลัพท์ที่ได้จากการลบ </a:t>
-            </a:r>
-            <a:r>
-              <a:rPr lang="en-US"/>
-              <a:t>Node </a:t>
-            </a:r>
-            <a:r>
-              <a:rPr lang="th-TH"/>
-              <a:t>และ </a:t>
-            </a:r>
-            <a:r>
-              <a:rPr lang="en-US"/>
-              <a:t>Edge</a:t>
-            </a:r>
-            <a:endParaRPr lang="th-TH"/>
-          </a:p>
-        </p:txBody>
-      </p:sp>
+      </p:pic>
     </p:spTree>
   </p:cSld>
   <p:clrMapOvr>
@@ -4209,60 +3925,9 @@
           <a:chExt cx="0" cy="0"/>
         </a:xfrm>
       </p:grpSpPr>
-      <p:sp>
-        <p:nvSpPr>
-          <p:cNvPr id="17410" name="Text Box 2"/>
-          <p:cNvSpPr txBox="1">
-            <a:spLocks noChangeArrowheads="1"/>
-          </p:cNvSpPr>
-          <p:nvPr/>
-        </p:nvSpPr>
-        <p:spPr bwMode="auto">
-          <a:xfrm>
-            <a:off x="1331913" y="692150"/>
-            <a:ext cx="5472112" cy="519113"/>
-          </a:xfrm>
-          <a:prstGeom prst="rect">
-            <a:avLst/>
-          </a:prstGeom>
-          <a:noFill/>
-          <a:ln w="9525">
-            <a:noFill/>
-            <a:miter lim="800000"/>
-            <a:headEnd/>
-            <a:tailEnd/>
-          </a:ln>
-          <a:effectLst/>
-        </p:spPr>
-        <p:txBody>
-          <a:bodyPr>
-            <a:spAutoFit/>
-          </a:bodyPr>
-          <a:lstStyle/>
-          <a:p>
-            <a:pPr>
-              <a:spcBef>
-                <a:spcPct val="50000"/>
-              </a:spcBef>
-            </a:pPr>
-            <a:r>
-              <a:rPr lang="th-TH"/>
-              <a:t>วิธีการหา </a:t>
-            </a:r>
-            <a:r>
-              <a:rPr lang="en-US"/>
-              <a:t>Highest Degree Node</a:t>
-            </a:r>
-            <a:r>
-              <a:rPr lang="th-TH"/>
-              <a:t> </a:t>
-            </a:r>
-          </a:p>
-        </p:txBody>
-      </p:sp>
       <p:pic>
         <p:nvPicPr>
-          <p:cNvPr id="17411" name="Picture 3"/>
+          <p:cNvPr id="2053" name="Picture 5"/>
           <p:cNvPicPr>
             <a:picLocks noChangeAspect="1" noChangeArrowheads="1"/>
           </p:cNvPicPr>
@@ -4277,8 +3942,8 @@
         </p:blipFill>
         <p:spPr bwMode="auto">
           <a:xfrm>
-            <a:off x="2051050" y="1268413"/>
-            <a:ext cx="4838700" cy="5057775"/>
+            <a:off x="1547813" y="908050"/>
+            <a:ext cx="4838700" cy="5086350"/>
           </a:xfrm>
           <a:prstGeom prst="rect">
             <a:avLst/>
@@ -4293,6 +3958,49 @@
           <a:effectLst/>
         </p:spPr>
       </p:pic>
+      <p:sp>
+        <p:nvSpPr>
+          <p:cNvPr id="2054" name="Text Box 6"/>
+          <p:cNvSpPr txBox="1">
+            <a:spLocks noChangeArrowheads="1"/>
+          </p:cNvSpPr>
+          <p:nvPr/>
+        </p:nvSpPr>
+        <p:spPr bwMode="auto">
+          <a:xfrm>
+            <a:off x="539750" y="404813"/>
+            <a:ext cx="6192838" cy="519112"/>
+          </a:xfrm>
+          <a:prstGeom prst="rect">
+            <a:avLst/>
+          </a:prstGeom>
+          <a:noFill/>
+          <a:ln w="9525">
+            <a:noFill/>
+            <a:miter lim="800000"/>
+            <a:headEnd/>
+            <a:tailEnd/>
+          </a:ln>
+          <a:effectLst/>
+        </p:spPr>
+        <p:txBody>
+          <a:bodyPr>
+            <a:spAutoFit/>
+          </a:bodyPr>
+          <a:lstStyle/>
+          <a:p>
+            <a:pPr>
+              <a:spcBef>
+                <a:spcPct val="50000"/>
+              </a:spcBef>
+            </a:pPr>
+            <a:r>
+              <a:rPr lang="th-TH" dirty="0"/>
+              <a:t>วิธีการใช้งานโปรแกรม</a:t>
+            </a:r>
+          </a:p>
+        </p:txBody>
+      </p:sp>
     </p:spTree>
   </p:cSld>
   <p:clrMapOvr>
@@ -4320,7 +4028,7 @@
       </p:grpSpPr>
       <p:pic>
         <p:nvPicPr>
-          <p:cNvPr id="16386" name="Picture 2"/>
+          <p:cNvPr id="3079" name="Picture 7"/>
           <p:cNvPicPr>
             <a:picLocks noChangeAspect="1" noChangeArrowheads="1"/>
           </p:cNvPicPr>
@@ -4335,8 +4043,8 @@
         </p:blipFill>
         <p:spPr bwMode="auto">
           <a:xfrm>
-            <a:off x="1908175" y="692150"/>
-            <a:ext cx="4838700" cy="5057775"/>
+            <a:off x="1979613" y="1125538"/>
+            <a:ext cx="4838700" cy="5086350"/>
           </a:xfrm>
           <a:prstGeom prst="rect">
             <a:avLst/>
@@ -4353,7 +4061,7 @@
       </p:pic>
       <p:sp>
         <p:nvSpPr>
-          <p:cNvPr id="16387" name="Text Box 3"/>
+          <p:cNvPr id="3080" name="Text Box 8"/>
           <p:cNvSpPr txBox="1">
             <a:spLocks noChangeArrowheads="1"/>
           </p:cNvSpPr>
@@ -4361,8 +4069,8 @@
         </p:nvSpPr>
         <p:spPr bwMode="auto">
           <a:xfrm>
-            <a:off x="684213" y="5949950"/>
-            <a:ext cx="6624637" cy="519113"/>
+            <a:off x="468313" y="5949950"/>
+            <a:ext cx="6480175" cy="519113"/>
           </a:xfrm>
           <a:prstGeom prst="rect">
             <a:avLst/>
@@ -4387,10 +4095,55 @@
                 <a:spcPct val="50000"/>
               </a:spcBef>
             </a:pPr>
+            <a:endParaRPr lang="th-TH"/>
+          </a:p>
+        </p:txBody>
+      </p:sp>
+      <p:sp>
+        <p:nvSpPr>
+          <p:cNvPr id="3081" name="Text Box 9"/>
+          <p:cNvSpPr txBox="1">
+            <a:spLocks noChangeArrowheads="1"/>
+          </p:cNvSpPr>
+          <p:nvPr/>
+        </p:nvSpPr>
+        <p:spPr bwMode="auto">
+          <a:xfrm>
+            <a:off x="468313" y="260350"/>
+            <a:ext cx="6264275" cy="519113"/>
+          </a:xfrm>
+          <a:prstGeom prst="rect">
+            <a:avLst/>
+          </a:prstGeom>
+          <a:noFill/>
+          <a:ln w="9525">
+            <a:noFill/>
+            <a:miter lim="800000"/>
+            <a:headEnd/>
+            <a:tailEnd/>
+          </a:ln>
+          <a:effectLst/>
+        </p:spPr>
+        <p:txBody>
+          <a:bodyPr>
+            <a:spAutoFit/>
+          </a:bodyPr>
+          <a:lstStyle/>
+          <a:p>
+            <a:pPr>
+              <a:spcBef>
+                <a:spcPct val="50000"/>
+              </a:spcBef>
+            </a:pPr>
             <a:r>
               <a:rPr lang="th-TH"/>
-              <a:t>แสดงผลลัพท์</a:t>
-            </a:r>
+              <a:t>วิธีการเปิดชิ้นงานไปที่ </a:t>
+            </a:r>
+            <a:r>
+              <a:rPr lang="en-US"/>
+              <a:t>file / Open file</a:t>
+            </a:r>
+            <a:endParaRPr lang="th-TH"/>
           </a:p>
         </p:txBody>
       </p:sp>
@@ -4421,7 +4174,7 @@
       </p:grpSpPr>
       <p:pic>
         <p:nvPicPr>
-          <p:cNvPr id="22532" name="Picture 4"/>
+          <p:cNvPr id="4101" name="Picture 5"/>
           <p:cNvPicPr>
             <a:picLocks noChangeAspect="1" noChangeArrowheads="1"/>
           </p:cNvPicPr>
@@ -4436,8 +4189,8 @@
         </p:blipFill>
         <p:spPr bwMode="auto">
           <a:xfrm>
-            <a:off x="2484438" y="1341438"/>
-            <a:ext cx="4838700" cy="5057775"/>
+            <a:off x="1042988" y="549275"/>
+            <a:ext cx="5362575" cy="3990975"/>
           </a:xfrm>
           <a:prstGeom prst="rect">
             <a:avLst/>
@@ -4454,7 +4207,7 @@
       </p:pic>
       <p:sp>
         <p:nvSpPr>
-          <p:cNvPr id="22533" name="Text Box 5"/>
+          <p:cNvPr id="4103" name="Text Box 7"/>
           <p:cNvSpPr txBox="1">
             <a:spLocks noChangeArrowheads="1"/>
           </p:cNvSpPr>
@@ -4462,8 +4215,8 @@
         </p:nvSpPr>
         <p:spPr bwMode="auto">
           <a:xfrm>
-            <a:off x="611188" y="476250"/>
-            <a:ext cx="5832475" cy="519113"/>
+            <a:off x="323850" y="5445125"/>
+            <a:ext cx="8280400" cy="519113"/>
           </a:xfrm>
           <a:prstGeom prst="rect">
             <a:avLst/>
@@ -4490,11 +4243,19 @@
             </a:pPr>
             <a:r>
               <a:rPr lang="th-TH"/>
-              <a:t>วิธีการหา </a:t>
+              <a:t>ไปที่โฟเดอร์ </a:t>
             </a:r>
             <a:r>
               <a:rPr lang="en-US"/>
-              <a:t>Breadth first traversal tree</a:t>
+              <a:t>inputGraphML </a:t>
+            </a:r>
+            <a:r>
+              <a:rPr lang="th-TH"/>
+              <a:t>เลือก </a:t>
+            </a:r>
+            <a:r>
+              <a:rPr lang="en-US"/>
+              <a:t>activitydiagram1</a:t>
             </a:r>
             <a:endParaRPr lang="th-TH"/>
           </a:p>
@@ -4622,6 +4383,1686 @@
       </p:grpSpPr>
       <p:pic>
         <p:nvPicPr>
+          <p:cNvPr id="5124" name="Picture 4"/>
+          <p:cNvPicPr>
+            <a:picLocks noChangeAspect="1" noChangeArrowheads="1"/>
+          </p:cNvPicPr>
+          <p:nvPr/>
+        </p:nvPicPr>
+        <p:blipFill>
+          <a:blip r:embed="rId2"/>
+          <a:srcRect/>
+          <a:stretch>
+            <a:fillRect/>
+          </a:stretch>
+        </p:blipFill>
+        <p:spPr bwMode="auto">
+          <a:xfrm>
+            <a:off x="827088" y="404813"/>
+            <a:ext cx="4838700" cy="5086350"/>
+          </a:xfrm>
+          <a:prstGeom prst="rect">
+            <a:avLst/>
+          </a:prstGeom>
+          <a:noFill/>
+          <a:ln w="9525">
+            <a:noFill/>
+            <a:miter lim="800000"/>
+            <a:headEnd/>
+            <a:tailEnd/>
+          </a:ln>
+          <a:effectLst/>
+        </p:spPr>
+      </p:pic>
+      <p:sp>
+        <p:nvSpPr>
+          <p:cNvPr id="5125" name="Text Box 5"/>
+          <p:cNvSpPr txBox="1">
+            <a:spLocks noChangeArrowheads="1"/>
+          </p:cNvSpPr>
+          <p:nvPr/>
+        </p:nvSpPr>
+        <p:spPr bwMode="auto">
+          <a:xfrm>
+            <a:off x="395288" y="6092825"/>
+            <a:ext cx="7416800" cy="519113"/>
+          </a:xfrm>
+          <a:prstGeom prst="rect">
+            <a:avLst/>
+          </a:prstGeom>
+          <a:noFill/>
+          <a:ln w="9525">
+            <a:noFill/>
+            <a:miter lim="800000"/>
+            <a:headEnd/>
+            <a:tailEnd/>
+          </a:ln>
+          <a:effectLst/>
+        </p:spPr>
+        <p:txBody>
+          <a:bodyPr>
+            <a:spAutoFit/>
+          </a:bodyPr>
+          <a:lstStyle/>
+          <a:p>
+            <a:pPr>
+              <a:spcBef>
+                <a:spcPct val="50000"/>
+              </a:spcBef>
+            </a:pPr>
+            <a:r>
+              <a:rPr lang="th-TH"/>
+              <a:t>ผลลัพย์ที่ได้จากการสร้างชิ้นงาน</a:t>
+            </a:r>
+          </a:p>
+        </p:txBody>
+      </p:sp>
+    </p:spTree>
+  </p:cSld>
+  <p:clrMapOvr>
+    <a:masterClrMapping/>
+  </p:clrMapOvr>
+</p:sld>
+</file>
+
+<file path=ppt/slides/slide21.xml><?xml version="1.0" encoding="utf-8"?>
+<p:sld xmlns:a="http://schemas.openxmlformats.org/drawingml/2006/main" xmlns:r="http://schemas.openxmlformats.org/officeDocument/2006/relationships" xmlns:p="http://schemas.openxmlformats.org/presentationml/2006/main">
+  <p:cSld>
+    <p:spTree>
+      <p:nvGrpSpPr>
+        <p:cNvPr id="1" name=""/>
+        <p:cNvGrpSpPr/>
+        <p:nvPr/>
+      </p:nvGrpSpPr>
+      <p:grpSpPr>
+        <a:xfrm>
+          <a:off x="0" y="0"/>
+          <a:ext cx="0" cy="0"/>
+          <a:chOff x="0" y="0"/>
+          <a:chExt cx="0" cy="0"/>
+        </a:xfrm>
+      </p:grpSpPr>
+      <p:pic>
+        <p:nvPicPr>
+          <p:cNvPr id="11266" name="Picture 2"/>
+          <p:cNvPicPr>
+            <a:picLocks noChangeAspect="1" noChangeArrowheads="1"/>
+          </p:cNvPicPr>
+          <p:nvPr/>
+        </p:nvPicPr>
+        <p:blipFill>
+          <a:blip r:embed="rId2"/>
+          <a:srcRect/>
+          <a:stretch>
+            <a:fillRect/>
+          </a:stretch>
+        </p:blipFill>
+        <p:spPr bwMode="auto">
+          <a:xfrm>
+            <a:off x="755650" y="260350"/>
+            <a:ext cx="4838700" cy="5057775"/>
+          </a:xfrm>
+          <a:prstGeom prst="rect">
+            <a:avLst/>
+          </a:prstGeom>
+          <a:noFill/>
+          <a:ln w="9525">
+            <a:noFill/>
+            <a:miter lim="800000"/>
+            <a:headEnd/>
+            <a:tailEnd/>
+          </a:ln>
+          <a:effectLst/>
+        </p:spPr>
+      </p:pic>
+      <p:sp>
+        <p:nvSpPr>
+          <p:cNvPr id="11267" name="Text Box 3"/>
+          <p:cNvSpPr txBox="1">
+            <a:spLocks noChangeArrowheads="1"/>
+          </p:cNvSpPr>
+          <p:nvPr/>
+        </p:nvSpPr>
+        <p:spPr bwMode="auto">
+          <a:xfrm>
+            <a:off x="395288" y="5794375"/>
+            <a:ext cx="5329237" cy="519113"/>
+          </a:xfrm>
+          <a:prstGeom prst="rect">
+            <a:avLst/>
+          </a:prstGeom>
+          <a:noFill/>
+          <a:ln w="9525">
+            <a:noFill/>
+            <a:miter lim="800000"/>
+            <a:headEnd/>
+            <a:tailEnd/>
+          </a:ln>
+          <a:effectLst/>
+        </p:spPr>
+        <p:txBody>
+          <a:bodyPr>
+            <a:spAutoFit/>
+          </a:bodyPr>
+          <a:lstStyle/>
+          <a:p>
+            <a:pPr>
+              <a:spcBef>
+                <a:spcPct val="50000"/>
+              </a:spcBef>
+            </a:pPr>
+            <a:r>
+              <a:rPr lang="th-TH"/>
+              <a:t>จัดแต่งให้สวยงาม</a:t>
+            </a:r>
+          </a:p>
+        </p:txBody>
+      </p:sp>
+    </p:spTree>
+  </p:cSld>
+  <p:clrMapOvr>
+    <a:masterClrMapping/>
+  </p:clrMapOvr>
+</p:sld>
+</file>
+
+<file path=ppt/slides/slide22.xml><?xml version="1.0" encoding="utf-8"?>
+<p:sld xmlns:a="http://schemas.openxmlformats.org/drawingml/2006/main" xmlns:r="http://schemas.openxmlformats.org/officeDocument/2006/relationships" xmlns:p="http://schemas.openxmlformats.org/presentationml/2006/main">
+  <p:cSld>
+    <p:spTree>
+      <p:nvGrpSpPr>
+        <p:cNvPr id="1" name=""/>
+        <p:cNvGrpSpPr/>
+        <p:nvPr/>
+      </p:nvGrpSpPr>
+      <p:grpSpPr>
+        <a:xfrm>
+          <a:off x="0" y="0"/>
+          <a:ext cx="0" cy="0"/>
+          <a:chOff x="0" y="0"/>
+          <a:chExt cx="0" cy="0"/>
+        </a:xfrm>
+      </p:grpSpPr>
+      <p:pic>
+        <p:nvPicPr>
+          <p:cNvPr id="10242" name="Picture 2"/>
+          <p:cNvPicPr>
+            <a:picLocks noChangeAspect="1" noChangeArrowheads="1"/>
+          </p:cNvPicPr>
+          <p:nvPr/>
+        </p:nvPicPr>
+        <p:blipFill>
+          <a:blip r:embed="rId2"/>
+          <a:srcRect/>
+          <a:stretch>
+            <a:fillRect/>
+          </a:stretch>
+        </p:blipFill>
+        <p:spPr bwMode="auto">
+          <a:xfrm>
+            <a:off x="971550" y="476250"/>
+            <a:ext cx="4838700" cy="5057775"/>
+          </a:xfrm>
+          <a:prstGeom prst="rect">
+            <a:avLst/>
+          </a:prstGeom>
+          <a:noFill/>
+          <a:ln w="9525">
+            <a:noFill/>
+            <a:miter lim="800000"/>
+            <a:headEnd/>
+            <a:tailEnd/>
+          </a:ln>
+          <a:effectLst/>
+        </p:spPr>
+      </p:pic>
+      <p:sp>
+        <p:nvSpPr>
+          <p:cNvPr id="10243" name="Text Box 3"/>
+          <p:cNvSpPr txBox="1">
+            <a:spLocks noChangeArrowheads="1"/>
+          </p:cNvSpPr>
+          <p:nvPr/>
+        </p:nvSpPr>
+        <p:spPr bwMode="auto">
+          <a:xfrm>
+            <a:off x="611188" y="6165850"/>
+            <a:ext cx="4465637" cy="519113"/>
+          </a:xfrm>
+          <a:prstGeom prst="rect">
+            <a:avLst/>
+          </a:prstGeom>
+          <a:noFill/>
+          <a:ln w="9525">
+            <a:noFill/>
+            <a:miter lim="800000"/>
+            <a:headEnd/>
+            <a:tailEnd/>
+          </a:ln>
+          <a:effectLst/>
+        </p:spPr>
+        <p:txBody>
+          <a:bodyPr>
+            <a:spAutoFit/>
+          </a:bodyPr>
+          <a:lstStyle/>
+          <a:p>
+            <a:pPr>
+              <a:spcBef>
+                <a:spcPct val="50000"/>
+              </a:spcBef>
+            </a:pPr>
+            <a:r>
+              <a:rPr lang="th-TH"/>
+              <a:t>วิธีการเพิ่มโหนด</a:t>
+            </a:r>
+          </a:p>
+        </p:txBody>
+      </p:sp>
+    </p:spTree>
+  </p:cSld>
+  <p:clrMapOvr>
+    <a:masterClrMapping/>
+  </p:clrMapOvr>
+</p:sld>
+</file>
+
+<file path=ppt/slides/slide23.xml><?xml version="1.0" encoding="utf-8"?>
+<p:sld xmlns:a="http://schemas.openxmlformats.org/drawingml/2006/main" xmlns:r="http://schemas.openxmlformats.org/officeDocument/2006/relationships" xmlns:p="http://schemas.openxmlformats.org/presentationml/2006/main">
+  <p:cSld>
+    <p:spTree>
+      <p:nvGrpSpPr>
+        <p:cNvPr id="1" name=""/>
+        <p:cNvGrpSpPr/>
+        <p:nvPr/>
+      </p:nvGrpSpPr>
+      <p:grpSpPr>
+        <a:xfrm>
+          <a:off x="0" y="0"/>
+          <a:ext cx="0" cy="0"/>
+          <a:chOff x="0" y="0"/>
+          <a:chExt cx="0" cy="0"/>
+        </a:xfrm>
+      </p:grpSpPr>
+      <p:pic>
+        <p:nvPicPr>
+          <p:cNvPr id="9219" name="Picture 3"/>
+          <p:cNvPicPr>
+            <a:picLocks noChangeAspect="1" noChangeArrowheads="1"/>
+          </p:cNvPicPr>
+          <p:nvPr/>
+        </p:nvPicPr>
+        <p:blipFill>
+          <a:blip r:embed="rId2"/>
+          <a:srcRect/>
+          <a:stretch>
+            <a:fillRect/>
+          </a:stretch>
+        </p:blipFill>
+        <p:spPr bwMode="auto">
+          <a:xfrm>
+            <a:off x="900113" y="260350"/>
+            <a:ext cx="4838700" cy="5057775"/>
+          </a:xfrm>
+          <a:prstGeom prst="rect">
+            <a:avLst/>
+          </a:prstGeom>
+          <a:noFill/>
+          <a:ln w="9525">
+            <a:noFill/>
+            <a:miter lim="800000"/>
+            <a:headEnd/>
+            <a:tailEnd/>
+          </a:ln>
+          <a:effectLst/>
+        </p:spPr>
+      </p:pic>
+      <p:sp>
+        <p:nvSpPr>
+          <p:cNvPr id="9220" name="Text Box 4"/>
+          <p:cNvSpPr txBox="1">
+            <a:spLocks noChangeArrowheads="1"/>
+          </p:cNvSpPr>
+          <p:nvPr/>
+        </p:nvSpPr>
+        <p:spPr bwMode="auto">
+          <a:xfrm>
+            <a:off x="755650" y="6092825"/>
+            <a:ext cx="6840538" cy="519113"/>
+          </a:xfrm>
+          <a:prstGeom prst="rect">
+            <a:avLst/>
+          </a:prstGeom>
+          <a:noFill/>
+          <a:ln w="9525">
+            <a:noFill/>
+            <a:miter lim="800000"/>
+            <a:headEnd/>
+            <a:tailEnd/>
+          </a:ln>
+          <a:effectLst/>
+        </p:spPr>
+        <p:txBody>
+          <a:bodyPr>
+            <a:spAutoFit/>
+          </a:bodyPr>
+          <a:lstStyle/>
+          <a:p>
+            <a:pPr>
+              <a:spcBef>
+                <a:spcPct val="50000"/>
+              </a:spcBef>
+            </a:pPr>
+            <a:r>
+              <a:rPr lang="th-TH"/>
+              <a:t>ป้อนข้อมูลที่ต้องการ</a:t>
+            </a:r>
+          </a:p>
+        </p:txBody>
+      </p:sp>
+      <p:pic>
+        <p:nvPicPr>
+          <p:cNvPr id="9221" name="Picture 5"/>
+          <p:cNvPicPr>
+            <a:picLocks noChangeAspect="1" noChangeArrowheads="1"/>
+          </p:cNvPicPr>
+          <p:nvPr/>
+        </p:nvPicPr>
+        <p:blipFill>
+          <a:blip r:embed="rId3"/>
+          <a:srcRect/>
+          <a:stretch>
+            <a:fillRect/>
+          </a:stretch>
+        </p:blipFill>
+        <p:spPr bwMode="auto">
+          <a:xfrm>
+            <a:off x="4857752" y="714356"/>
+            <a:ext cx="1981200" cy="1276350"/>
+          </a:xfrm>
+          <a:prstGeom prst="rect">
+            <a:avLst/>
+          </a:prstGeom>
+          <a:noFill/>
+          <a:ln w="9525">
+            <a:noFill/>
+            <a:miter lim="800000"/>
+            <a:headEnd/>
+            <a:tailEnd/>
+          </a:ln>
+          <a:effectLst/>
+        </p:spPr>
+      </p:pic>
+    </p:spTree>
+  </p:cSld>
+  <p:clrMapOvr>
+    <a:masterClrMapping/>
+  </p:clrMapOvr>
+</p:sld>
+</file>
+
+<file path=ppt/slides/slide24.xml><?xml version="1.0" encoding="utf-8"?>
+<p:sld xmlns:a="http://schemas.openxmlformats.org/drawingml/2006/main" xmlns:r="http://schemas.openxmlformats.org/officeDocument/2006/relationships" xmlns:p="http://schemas.openxmlformats.org/presentationml/2006/main">
+  <p:cSld>
+    <p:spTree>
+      <p:nvGrpSpPr>
+        <p:cNvPr id="1" name=""/>
+        <p:cNvGrpSpPr/>
+        <p:nvPr/>
+      </p:nvGrpSpPr>
+      <p:grpSpPr>
+        <a:xfrm>
+          <a:off x="0" y="0"/>
+          <a:ext cx="0" cy="0"/>
+          <a:chOff x="0" y="0"/>
+          <a:chExt cx="0" cy="0"/>
+        </a:xfrm>
+      </p:grpSpPr>
+      <p:pic>
+        <p:nvPicPr>
+          <p:cNvPr id="8194" name="Picture 2"/>
+          <p:cNvPicPr>
+            <a:picLocks noChangeAspect="1" noChangeArrowheads="1"/>
+          </p:cNvPicPr>
+          <p:nvPr/>
+        </p:nvPicPr>
+        <p:blipFill>
+          <a:blip r:embed="rId2"/>
+          <a:srcRect/>
+          <a:stretch>
+            <a:fillRect/>
+          </a:stretch>
+        </p:blipFill>
+        <p:spPr bwMode="auto">
+          <a:xfrm>
+            <a:off x="1042988" y="333375"/>
+            <a:ext cx="4838700" cy="5057775"/>
+          </a:xfrm>
+          <a:prstGeom prst="rect">
+            <a:avLst/>
+          </a:prstGeom>
+          <a:noFill/>
+          <a:ln w="9525">
+            <a:noFill/>
+            <a:miter lim="800000"/>
+            <a:headEnd/>
+            <a:tailEnd/>
+          </a:ln>
+          <a:effectLst/>
+        </p:spPr>
+      </p:pic>
+      <p:sp>
+        <p:nvSpPr>
+          <p:cNvPr id="8196" name="Text Box 4"/>
+          <p:cNvSpPr txBox="1">
+            <a:spLocks noChangeArrowheads="1"/>
+          </p:cNvSpPr>
+          <p:nvPr/>
+        </p:nvSpPr>
+        <p:spPr bwMode="auto">
+          <a:xfrm>
+            <a:off x="323850" y="5949950"/>
+            <a:ext cx="7272338" cy="519113"/>
+          </a:xfrm>
+          <a:prstGeom prst="rect">
+            <a:avLst/>
+          </a:prstGeom>
+          <a:noFill/>
+          <a:ln w="9525">
+            <a:noFill/>
+            <a:miter lim="800000"/>
+            <a:headEnd/>
+            <a:tailEnd/>
+          </a:ln>
+          <a:effectLst/>
+        </p:spPr>
+        <p:txBody>
+          <a:bodyPr>
+            <a:spAutoFit/>
+          </a:bodyPr>
+          <a:lstStyle/>
+          <a:p>
+            <a:pPr>
+              <a:spcBef>
+                <a:spcPct val="50000"/>
+              </a:spcBef>
+            </a:pPr>
+            <a:endParaRPr lang="th-TH"/>
+          </a:p>
+        </p:txBody>
+      </p:sp>
+    </p:spTree>
+  </p:cSld>
+  <p:clrMapOvr>
+    <a:masterClrMapping/>
+  </p:clrMapOvr>
+</p:sld>
+</file>
+
+<file path=ppt/slides/slide25.xml><?xml version="1.0" encoding="utf-8"?>
+<p:sld xmlns:a="http://schemas.openxmlformats.org/drawingml/2006/main" xmlns:r="http://schemas.openxmlformats.org/officeDocument/2006/relationships" xmlns:p="http://schemas.openxmlformats.org/presentationml/2006/main">
+  <p:cSld>
+    <p:spTree>
+      <p:nvGrpSpPr>
+        <p:cNvPr id="1" name=""/>
+        <p:cNvGrpSpPr/>
+        <p:nvPr/>
+      </p:nvGrpSpPr>
+      <p:grpSpPr>
+        <a:xfrm>
+          <a:off x="0" y="0"/>
+          <a:ext cx="0" cy="0"/>
+          <a:chOff x="0" y="0"/>
+          <a:chExt cx="0" cy="0"/>
+        </a:xfrm>
+      </p:grpSpPr>
+      <p:pic>
+        <p:nvPicPr>
+          <p:cNvPr id="12292" name="Picture 4"/>
+          <p:cNvPicPr>
+            <a:picLocks noChangeAspect="1" noChangeArrowheads="1"/>
+          </p:cNvPicPr>
+          <p:nvPr/>
+        </p:nvPicPr>
+        <p:blipFill>
+          <a:blip r:embed="rId2"/>
+          <a:srcRect/>
+          <a:stretch>
+            <a:fillRect/>
+          </a:stretch>
+        </p:blipFill>
+        <p:spPr bwMode="auto">
+          <a:xfrm>
+            <a:off x="1476375" y="333375"/>
+            <a:ext cx="4838700" cy="5057775"/>
+          </a:xfrm>
+          <a:prstGeom prst="rect">
+            <a:avLst/>
+          </a:prstGeom>
+          <a:noFill/>
+          <a:ln w="9525">
+            <a:noFill/>
+            <a:miter lim="800000"/>
+            <a:headEnd/>
+            <a:tailEnd/>
+          </a:ln>
+          <a:effectLst/>
+        </p:spPr>
+      </p:pic>
+    </p:spTree>
+  </p:cSld>
+  <p:clrMapOvr>
+    <a:masterClrMapping/>
+  </p:clrMapOvr>
+</p:sld>
+</file>
+
+<file path=ppt/slides/slide26.xml><?xml version="1.0" encoding="utf-8"?>
+<p:sld xmlns:a="http://schemas.openxmlformats.org/drawingml/2006/main" xmlns:r="http://schemas.openxmlformats.org/officeDocument/2006/relationships" xmlns:p="http://schemas.openxmlformats.org/presentationml/2006/main">
+  <p:cSld>
+    <p:spTree>
+      <p:nvGrpSpPr>
+        <p:cNvPr id="1" name=""/>
+        <p:cNvGrpSpPr/>
+        <p:nvPr/>
+      </p:nvGrpSpPr>
+      <p:grpSpPr>
+        <a:xfrm>
+          <a:off x="0" y="0"/>
+          <a:ext cx="0" cy="0"/>
+          <a:chOff x="0" y="0"/>
+          <a:chExt cx="0" cy="0"/>
+        </a:xfrm>
+      </p:grpSpPr>
+      <p:pic>
+        <p:nvPicPr>
+          <p:cNvPr id="13316" name="Picture 4"/>
+          <p:cNvPicPr>
+            <a:picLocks noChangeAspect="1" noChangeArrowheads="1"/>
+          </p:cNvPicPr>
+          <p:nvPr/>
+        </p:nvPicPr>
+        <p:blipFill>
+          <a:blip r:embed="rId2"/>
+          <a:srcRect/>
+          <a:stretch>
+            <a:fillRect/>
+          </a:stretch>
+        </p:blipFill>
+        <p:spPr bwMode="auto">
+          <a:xfrm>
+            <a:off x="1042988" y="333375"/>
+            <a:ext cx="4838700" cy="5057775"/>
+          </a:xfrm>
+          <a:prstGeom prst="rect">
+            <a:avLst/>
+          </a:prstGeom>
+          <a:noFill/>
+          <a:ln w="9525">
+            <a:noFill/>
+            <a:miter lim="800000"/>
+            <a:headEnd/>
+            <a:tailEnd/>
+          </a:ln>
+          <a:effectLst/>
+        </p:spPr>
+      </p:pic>
+      <p:pic>
+        <p:nvPicPr>
+          <p:cNvPr id="13314" name="Picture 2"/>
+          <p:cNvPicPr>
+            <a:picLocks noChangeAspect="1" noChangeArrowheads="1"/>
+          </p:cNvPicPr>
+          <p:nvPr/>
+        </p:nvPicPr>
+        <p:blipFill>
+          <a:blip r:embed="rId3"/>
+          <a:srcRect/>
+          <a:stretch>
+            <a:fillRect/>
+          </a:stretch>
+        </p:blipFill>
+        <p:spPr bwMode="auto">
+          <a:xfrm>
+            <a:off x="4859338" y="1125538"/>
+            <a:ext cx="1981200" cy="1276350"/>
+          </a:xfrm>
+          <a:prstGeom prst="rect">
+            <a:avLst/>
+          </a:prstGeom>
+          <a:noFill/>
+          <a:ln w="9525">
+            <a:noFill/>
+            <a:miter lim="800000"/>
+            <a:headEnd/>
+            <a:tailEnd/>
+          </a:ln>
+          <a:effectLst/>
+        </p:spPr>
+      </p:pic>
+      <p:sp>
+        <p:nvSpPr>
+          <p:cNvPr id="13318" name="Line 6"/>
+          <p:cNvSpPr>
+            <a:spLocks noChangeShapeType="1"/>
+          </p:cNvSpPr>
+          <p:nvPr/>
+        </p:nvSpPr>
+        <p:spPr bwMode="auto">
+          <a:xfrm>
+            <a:off x="5651500" y="1844675"/>
+            <a:ext cx="1873250" cy="0"/>
+          </a:xfrm>
+          <a:prstGeom prst="line">
+            <a:avLst/>
+          </a:prstGeom>
+          <a:noFill/>
+          <a:ln w="12700">
+            <a:solidFill>
+              <a:schemeClr val="tx1"/>
+            </a:solidFill>
+            <a:round/>
+            <a:headEnd/>
+            <a:tailEnd type="triangle" w="med" len="med"/>
+          </a:ln>
+          <a:effectLst/>
+        </p:spPr>
+        <p:txBody>
+          <a:bodyPr/>
+          <a:lstStyle/>
+          <a:p>
+            <a:endParaRPr lang="th-TH"/>
+          </a:p>
+        </p:txBody>
+      </p:sp>
+      <p:sp>
+        <p:nvSpPr>
+          <p:cNvPr id="13319" name="Text Box 7"/>
+          <p:cNvSpPr txBox="1">
+            <a:spLocks noChangeArrowheads="1"/>
+          </p:cNvSpPr>
+          <p:nvPr/>
+        </p:nvSpPr>
+        <p:spPr bwMode="auto">
+          <a:xfrm>
+            <a:off x="7596188" y="1557338"/>
+            <a:ext cx="1296987" cy="946150"/>
+          </a:xfrm>
+          <a:prstGeom prst="rect">
+            <a:avLst/>
+          </a:prstGeom>
+          <a:noFill/>
+          <a:ln w="9525">
+            <a:noFill/>
+            <a:miter lim="800000"/>
+            <a:headEnd/>
+            <a:tailEnd/>
+          </a:ln>
+          <a:effectLst/>
+        </p:spPr>
+        <p:txBody>
+          <a:bodyPr>
+            <a:spAutoFit/>
+          </a:bodyPr>
+          <a:lstStyle/>
+          <a:p>
+            <a:pPr>
+              <a:spcBef>
+                <a:spcPct val="50000"/>
+              </a:spcBef>
+            </a:pPr>
+            <a:r>
+              <a:rPr lang="th-TH"/>
+              <a:t>ระบุจุดเริ่มต้น</a:t>
+            </a:r>
+          </a:p>
+        </p:txBody>
+      </p:sp>
+      <p:pic>
+        <p:nvPicPr>
+          <p:cNvPr id="13320" name="Picture 8"/>
+          <p:cNvPicPr>
+            <a:picLocks noChangeAspect="1" noChangeArrowheads="1"/>
+          </p:cNvPicPr>
+          <p:nvPr/>
+        </p:nvPicPr>
+        <p:blipFill>
+          <a:blip r:embed="rId4"/>
+          <a:srcRect/>
+          <a:stretch>
+            <a:fillRect/>
+          </a:stretch>
+        </p:blipFill>
+        <p:spPr bwMode="auto">
+          <a:xfrm>
+            <a:off x="4859338" y="2924175"/>
+            <a:ext cx="1981200" cy="1276350"/>
+          </a:xfrm>
+          <a:prstGeom prst="rect">
+            <a:avLst/>
+          </a:prstGeom>
+          <a:noFill/>
+          <a:ln w="9525">
+            <a:noFill/>
+            <a:miter lim="800000"/>
+            <a:headEnd/>
+            <a:tailEnd/>
+          </a:ln>
+          <a:effectLst/>
+        </p:spPr>
+      </p:pic>
+      <p:sp>
+        <p:nvSpPr>
+          <p:cNvPr id="13321" name="Line 9"/>
+          <p:cNvSpPr>
+            <a:spLocks noChangeShapeType="1"/>
+          </p:cNvSpPr>
+          <p:nvPr/>
+        </p:nvSpPr>
+        <p:spPr bwMode="auto">
+          <a:xfrm>
+            <a:off x="5651500" y="3644900"/>
+            <a:ext cx="1873250" cy="0"/>
+          </a:xfrm>
+          <a:prstGeom prst="line">
+            <a:avLst/>
+          </a:prstGeom>
+          <a:noFill/>
+          <a:ln w="12700">
+            <a:solidFill>
+              <a:schemeClr val="tx1"/>
+            </a:solidFill>
+            <a:round/>
+            <a:headEnd/>
+            <a:tailEnd type="triangle" w="med" len="med"/>
+          </a:ln>
+          <a:effectLst/>
+        </p:spPr>
+        <p:txBody>
+          <a:bodyPr/>
+          <a:lstStyle/>
+          <a:p>
+            <a:endParaRPr lang="th-TH"/>
+          </a:p>
+        </p:txBody>
+      </p:sp>
+      <p:sp>
+        <p:nvSpPr>
+          <p:cNvPr id="13322" name="Text Box 10"/>
+          <p:cNvSpPr txBox="1">
+            <a:spLocks noChangeArrowheads="1"/>
+          </p:cNvSpPr>
+          <p:nvPr/>
+        </p:nvSpPr>
+        <p:spPr bwMode="auto">
+          <a:xfrm>
+            <a:off x="7524750" y="3357563"/>
+            <a:ext cx="1150938" cy="946150"/>
+          </a:xfrm>
+          <a:prstGeom prst="rect">
+            <a:avLst/>
+          </a:prstGeom>
+          <a:noFill/>
+          <a:ln w="9525">
+            <a:noFill/>
+            <a:miter lim="800000"/>
+            <a:headEnd/>
+            <a:tailEnd/>
+          </a:ln>
+          <a:effectLst/>
+        </p:spPr>
+        <p:txBody>
+          <a:bodyPr>
+            <a:spAutoFit/>
+          </a:bodyPr>
+          <a:lstStyle/>
+          <a:p>
+            <a:pPr>
+              <a:spcBef>
+                <a:spcPct val="50000"/>
+              </a:spcBef>
+            </a:pPr>
+            <a:r>
+              <a:rPr lang="th-TH"/>
+              <a:t>ระบุปลายทาง</a:t>
+            </a:r>
+          </a:p>
+        </p:txBody>
+      </p:sp>
+    </p:spTree>
+  </p:cSld>
+  <p:clrMapOvr>
+    <a:masterClrMapping/>
+  </p:clrMapOvr>
+</p:sld>
+</file>
+
+<file path=ppt/slides/slide27.xml><?xml version="1.0" encoding="utf-8"?>
+<p:sld xmlns:a="http://schemas.openxmlformats.org/drawingml/2006/main" xmlns:r="http://schemas.openxmlformats.org/officeDocument/2006/relationships" xmlns:p="http://schemas.openxmlformats.org/presentationml/2006/main">
+  <p:cSld>
+    <p:spTree>
+      <p:nvGrpSpPr>
+        <p:cNvPr id="1" name=""/>
+        <p:cNvGrpSpPr/>
+        <p:nvPr/>
+      </p:nvGrpSpPr>
+      <p:grpSpPr>
+        <a:xfrm>
+          <a:off x="0" y="0"/>
+          <a:ext cx="0" cy="0"/>
+          <a:chOff x="0" y="0"/>
+          <a:chExt cx="0" cy="0"/>
+        </a:xfrm>
+      </p:grpSpPr>
+      <p:pic>
+        <p:nvPicPr>
+          <p:cNvPr id="21506" name="Picture 2"/>
+          <p:cNvPicPr>
+            <a:picLocks noChangeAspect="1" noChangeArrowheads="1"/>
+          </p:cNvPicPr>
+          <p:nvPr/>
+        </p:nvPicPr>
+        <p:blipFill>
+          <a:blip r:embed="rId2"/>
+          <a:srcRect/>
+          <a:stretch>
+            <a:fillRect/>
+          </a:stretch>
+        </p:blipFill>
+        <p:spPr bwMode="auto">
+          <a:xfrm>
+            <a:off x="2051050" y="476250"/>
+            <a:ext cx="4838700" cy="5057775"/>
+          </a:xfrm>
+          <a:prstGeom prst="rect">
+            <a:avLst/>
+          </a:prstGeom>
+          <a:noFill/>
+          <a:ln w="9525">
+            <a:noFill/>
+            <a:miter lim="800000"/>
+            <a:headEnd/>
+            <a:tailEnd/>
+          </a:ln>
+          <a:effectLst/>
+        </p:spPr>
+      </p:pic>
+      <p:sp>
+        <p:nvSpPr>
+          <p:cNvPr id="21511" name="Text Box 7"/>
+          <p:cNvSpPr txBox="1">
+            <a:spLocks noChangeArrowheads="1"/>
+          </p:cNvSpPr>
+          <p:nvPr/>
+        </p:nvSpPr>
+        <p:spPr bwMode="auto">
+          <a:xfrm>
+            <a:off x="1116013" y="5805488"/>
+            <a:ext cx="6335712" cy="519112"/>
+          </a:xfrm>
+          <a:prstGeom prst="rect">
+            <a:avLst/>
+          </a:prstGeom>
+          <a:noFill/>
+          <a:ln w="9525">
+            <a:noFill/>
+            <a:miter lim="800000"/>
+            <a:headEnd/>
+            <a:tailEnd/>
+          </a:ln>
+          <a:effectLst/>
+        </p:spPr>
+        <p:txBody>
+          <a:bodyPr>
+            <a:spAutoFit/>
+          </a:bodyPr>
+          <a:lstStyle/>
+          <a:p>
+            <a:pPr>
+              <a:spcBef>
+                <a:spcPct val="50000"/>
+              </a:spcBef>
+            </a:pPr>
+            <a:r>
+              <a:rPr lang="th-TH"/>
+              <a:t>ผลลัพท์จากการเพิ่ม </a:t>
+            </a:r>
+            <a:r>
+              <a:rPr lang="en-US"/>
+              <a:t>node </a:t>
+            </a:r>
+            <a:r>
+              <a:rPr lang="th-TH"/>
+              <a:t>และ </a:t>
+            </a:r>
+            <a:r>
+              <a:rPr lang="en-US"/>
+              <a:t>Edge</a:t>
+            </a:r>
+            <a:endParaRPr lang="th-TH"/>
+          </a:p>
+        </p:txBody>
+      </p:sp>
+    </p:spTree>
+  </p:cSld>
+  <p:clrMapOvr>
+    <a:masterClrMapping/>
+  </p:clrMapOvr>
+</p:sld>
+</file>
+
+<file path=ppt/slides/slide28.xml><?xml version="1.0" encoding="utf-8"?>
+<p:sld xmlns:a="http://schemas.openxmlformats.org/drawingml/2006/main" xmlns:r="http://schemas.openxmlformats.org/officeDocument/2006/relationships" xmlns:p="http://schemas.openxmlformats.org/presentationml/2006/main">
+  <p:cSld>
+    <p:spTree>
+      <p:nvGrpSpPr>
+        <p:cNvPr id="1" name=""/>
+        <p:cNvGrpSpPr/>
+        <p:nvPr/>
+      </p:nvGrpSpPr>
+      <p:grpSpPr>
+        <a:xfrm>
+          <a:off x="0" y="0"/>
+          <a:ext cx="0" cy="0"/>
+          <a:chOff x="0" y="0"/>
+          <a:chExt cx="0" cy="0"/>
+        </a:xfrm>
+      </p:grpSpPr>
+      <p:sp>
+        <p:nvSpPr>
+          <p:cNvPr id="20482" name="Text Box 2"/>
+          <p:cNvSpPr txBox="1">
+            <a:spLocks noChangeArrowheads="1"/>
+          </p:cNvSpPr>
+          <p:nvPr/>
+        </p:nvSpPr>
+        <p:spPr bwMode="auto">
+          <a:xfrm>
+            <a:off x="1403350" y="404813"/>
+            <a:ext cx="5256213" cy="519112"/>
+          </a:xfrm>
+          <a:prstGeom prst="rect">
+            <a:avLst/>
+          </a:prstGeom>
+          <a:noFill/>
+          <a:ln w="9525">
+            <a:noFill/>
+            <a:miter lim="800000"/>
+            <a:headEnd/>
+            <a:tailEnd/>
+          </a:ln>
+          <a:effectLst/>
+        </p:spPr>
+        <p:txBody>
+          <a:bodyPr>
+            <a:spAutoFit/>
+          </a:bodyPr>
+          <a:lstStyle/>
+          <a:p>
+            <a:pPr>
+              <a:spcBef>
+                <a:spcPct val="50000"/>
+              </a:spcBef>
+            </a:pPr>
+            <a:r>
+              <a:rPr lang="th-TH"/>
+              <a:t>วิธีการลบ </a:t>
+            </a:r>
+            <a:r>
+              <a:rPr lang="en-US"/>
+              <a:t>Node </a:t>
+            </a:r>
+            <a:r>
+              <a:rPr lang="th-TH"/>
+              <a:t>และ </a:t>
+            </a:r>
+            <a:r>
+              <a:rPr lang="en-US"/>
+              <a:t>Edge</a:t>
+            </a:r>
+            <a:endParaRPr lang="th-TH"/>
+          </a:p>
+        </p:txBody>
+      </p:sp>
+      <p:pic>
+        <p:nvPicPr>
+          <p:cNvPr id="20483" name="Picture 3"/>
+          <p:cNvPicPr>
+            <a:picLocks noChangeAspect="1" noChangeArrowheads="1"/>
+          </p:cNvPicPr>
+          <p:nvPr/>
+        </p:nvPicPr>
+        <p:blipFill>
+          <a:blip r:embed="rId2"/>
+          <a:srcRect/>
+          <a:stretch>
+            <a:fillRect/>
+          </a:stretch>
+        </p:blipFill>
+        <p:spPr bwMode="auto">
+          <a:xfrm>
+            <a:off x="2555875" y="1052513"/>
+            <a:ext cx="4838700" cy="5057775"/>
+          </a:xfrm>
+          <a:prstGeom prst="rect">
+            <a:avLst/>
+          </a:prstGeom>
+          <a:noFill/>
+          <a:ln w="9525">
+            <a:noFill/>
+            <a:miter lim="800000"/>
+            <a:headEnd/>
+            <a:tailEnd/>
+          </a:ln>
+          <a:effectLst/>
+        </p:spPr>
+      </p:pic>
+    </p:spTree>
+  </p:cSld>
+  <p:clrMapOvr>
+    <a:masterClrMapping/>
+  </p:clrMapOvr>
+</p:sld>
+</file>
+
+<file path=ppt/slides/slide29.xml><?xml version="1.0" encoding="utf-8"?>
+<p:sld xmlns:a="http://schemas.openxmlformats.org/drawingml/2006/main" xmlns:r="http://schemas.openxmlformats.org/officeDocument/2006/relationships" xmlns:p="http://schemas.openxmlformats.org/presentationml/2006/main">
+  <p:cSld>
+    <p:spTree>
+      <p:nvGrpSpPr>
+        <p:cNvPr id="1" name=""/>
+        <p:cNvGrpSpPr/>
+        <p:nvPr/>
+      </p:nvGrpSpPr>
+      <p:grpSpPr>
+        <a:xfrm>
+          <a:off x="0" y="0"/>
+          <a:ext cx="0" cy="0"/>
+          <a:chOff x="0" y="0"/>
+          <a:chExt cx="0" cy="0"/>
+        </a:xfrm>
+      </p:grpSpPr>
+      <p:pic>
+        <p:nvPicPr>
+          <p:cNvPr id="19460" name="Picture 4"/>
+          <p:cNvPicPr>
+            <a:picLocks noChangeAspect="1" noChangeArrowheads="1"/>
+          </p:cNvPicPr>
+          <p:nvPr/>
+        </p:nvPicPr>
+        <p:blipFill>
+          <a:blip r:embed="rId2"/>
+          <a:srcRect/>
+          <a:stretch>
+            <a:fillRect/>
+          </a:stretch>
+        </p:blipFill>
+        <p:spPr bwMode="auto">
+          <a:xfrm>
+            <a:off x="1042988" y="549275"/>
+            <a:ext cx="4838700" cy="5057775"/>
+          </a:xfrm>
+          <a:prstGeom prst="rect">
+            <a:avLst/>
+          </a:prstGeom>
+          <a:noFill/>
+          <a:ln w="9525">
+            <a:noFill/>
+            <a:miter lim="800000"/>
+            <a:headEnd/>
+            <a:tailEnd/>
+          </a:ln>
+          <a:effectLst/>
+        </p:spPr>
+      </p:pic>
+      <p:pic>
+        <p:nvPicPr>
+          <p:cNvPr id="19458" name="Picture 2"/>
+          <p:cNvPicPr>
+            <a:picLocks noChangeAspect="1" noChangeArrowheads="1"/>
+          </p:cNvPicPr>
+          <p:nvPr/>
+        </p:nvPicPr>
+        <p:blipFill>
+          <a:blip r:embed="rId3"/>
+          <a:srcRect/>
+          <a:stretch>
+            <a:fillRect/>
+          </a:stretch>
+        </p:blipFill>
+        <p:spPr bwMode="auto">
+          <a:xfrm>
+            <a:off x="4859338" y="1268413"/>
+            <a:ext cx="1981200" cy="1276350"/>
+          </a:xfrm>
+          <a:prstGeom prst="rect">
+            <a:avLst/>
+          </a:prstGeom>
+          <a:noFill/>
+          <a:ln w="9525">
+            <a:noFill/>
+            <a:miter lim="800000"/>
+            <a:headEnd/>
+            <a:tailEnd/>
+          </a:ln>
+          <a:effectLst/>
+        </p:spPr>
+      </p:pic>
+    </p:spTree>
+  </p:cSld>
+  <p:clrMapOvr>
+    <a:masterClrMapping/>
+  </p:clrMapOvr>
+</p:sld>
+</file>
+
+<file path=ppt/slides/slide3.xml><?xml version="1.0" encoding="utf-8"?>
+<p:sld xmlns:a="http://schemas.openxmlformats.org/drawingml/2006/main" xmlns:r="http://schemas.openxmlformats.org/officeDocument/2006/relationships" xmlns:p="http://schemas.openxmlformats.org/presentationml/2006/main">
+  <p:cSld>
+    <p:spTree>
+      <p:nvGrpSpPr>
+        <p:cNvPr id="1" name=""/>
+        <p:cNvGrpSpPr/>
+        <p:nvPr/>
+      </p:nvGrpSpPr>
+      <p:grpSpPr>
+        <a:xfrm>
+          <a:off x="0" y="0"/>
+          <a:ext cx="0" cy="0"/>
+          <a:chOff x="0" y="0"/>
+          <a:chExt cx="0" cy="0"/>
+        </a:xfrm>
+      </p:grpSpPr>
+      <p:pic>
+        <p:nvPicPr>
+          <p:cNvPr id="1026" name="Picture 2"/>
+          <p:cNvPicPr>
+            <a:picLocks noChangeAspect="1" noChangeArrowheads="1"/>
+          </p:cNvPicPr>
+          <p:nvPr/>
+        </p:nvPicPr>
+        <p:blipFill>
+          <a:blip r:embed="rId2"/>
+          <a:srcRect/>
+          <a:stretch>
+            <a:fillRect/>
+          </a:stretch>
+        </p:blipFill>
+        <p:spPr bwMode="auto">
+          <a:xfrm>
+            <a:off x="2152650" y="885825"/>
+            <a:ext cx="4838700" cy="5086350"/>
+          </a:xfrm>
+          <a:prstGeom prst="rect">
+            <a:avLst/>
+          </a:prstGeom>
+          <a:noFill/>
+          <a:ln w="9525">
+            <a:noFill/>
+            <a:miter lim="800000"/>
+            <a:headEnd/>
+            <a:tailEnd/>
+          </a:ln>
+          <a:effectLst/>
+        </p:spPr>
+      </p:pic>
+    </p:spTree>
+  </p:cSld>
+  <p:clrMapOvr>
+    <a:masterClrMapping/>
+  </p:clrMapOvr>
+</p:sld>
+</file>
+
+<file path=ppt/slides/slide30.xml><?xml version="1.0" encoding="utf-8"?>
+<p:sld xmlns:a="http://schemas.openxmlformats.org/drawingml/2006/main" xmlns:r="http://schemas.openxmlformats.org/officeDocument/2006/relationships" xmlns:p="http://schemas.openxmlformats.org/presentationml/2006/main">
+  <p:cSld>
+    <p:spTree>
+      <p:nvGrpSpPr>
+        <p:cNvPr id="1" name=""/>
+        <p:cNvGrpSpPr/>
+        <p:nvPr/>
+      </p:nvGrpSpPr>
+      <p:grpSpPr>
+        <a:xfrm>
+          <a:off x="0" y="0"/>
+          <a:ext cx="0" cy="0"/>
+          <a:chOff x="0" y="0"/>
+          <a:chExt cx="0" cy="0"/>
+        </a:xfrm>
+      </p:grpSpPr>
+      <p:pic>
+        <p:nvPicPr>
+          <p:cNvPr id="18434" name="Picture 2"/>
+          <p:cNvPicPr>
+            <a:picLocks noChangeAspect="1" noChangeArrowheads="1"/>
+          </p:cNvPicPr>
+          <p:nvPr/>
+        </p:nvPicPr>
+        <p:blipFill>
+          <a:blip r:embed="rId2"/>
+          <a:srcRect/>
+          <a:stretch>
+            <a:fillRect/>
+          </a:stretch>
+        </p:blipFill>
+        <p:spPr bwMode="auto">
+          <a:xfrm>
+            <a:off x="2124075" y="404813"/>
+            <a:ext cx="4838700" cy="5057775"/>
+          </a:xfrm>
+          <a:prstGeom prst="rect">
+            <a:avLst/>
+          </a:prstGeom>
+          <a:noFill/>
+          <a:ln w="9525">
+            <a:noFill/>
+            <a:miter lim="800000"/>
+            <a:headEnd/>
+            <a:tailEnd/>
+          </a:ln>
+          <a:effectLst/>
+        </p:spPr>
+      </p:pic>
+      <p:sp>
+        <p:nvSpPr>
+          <p:cNvPr id="18435" name="Text Box 3"/>
+          <p:cNvSpPr txBox="1">
+            <a:spLocks noChangeArrowheads="1"/>
+          </p:cNvSpPr>
+          <p:nvPr/>
+        </p:nvSpPr>
+        <p:spPr bwMode="auto">
+          <a:xfrm>
+            <a:off x="684213" y="5805488"/>
+            <a:ext cx="5616575" cy="519112"/>
+          </a:xfrm>
+          <a:prstGeom prst="rect">
+            <a:avLst/>
+          </a:prstGeom>
+          <a:noFill/>
+          <a:ln w="9525">
+            <a:noFill/>
+            <a:miter lim="800000"/>
+            <a:headEnd/>
+            <a:tailEnd/>
+          </a:ln>
+          <a:effectLst/>
+        </p:spPr>
+        <p:txBody>
+          <a:bodyPr>
+            <a:spAutoFit/>
+          </a:bodyPr>
+          <a:lstStyle/>
+          <a:p>
+            <a:pPr>
+              <a:spcBef>
+                <a:spcPct val="50000"/>
+              </a:spcBef>
+            </a:pPr>
+            <a:r>
+              <a:rPr lang="th-TH"/>
+              <a:t>ผลลัพท์ที่ได้จากการลบ </a:t>
+            </a:r>
+            <a:r>
+              <a:rPr lang="en-US"/>
+              <a:t>Node </a:t>
+            </a:r>
+            <a:r>
+              <a:rPr lang="th-TH"/>
+              <a:t>และ </a:t>
+            </a:r>
+            <a:r>
+              <a:rPr lang="en-US"/>
+              <a:t>Edge</a:t>
+            </a:r>
+            <a:endParaRPr lang="th-TH"/>
+          </a:p>
+        </p:txBody>
+      </p:sp>
+    </p:spTree>
+  </p:cSld>
+  <p:clrMapOvr>
+    <a:masterClrMapping/>
+  </p:clrMapOvr>
+</p:sld>
+</file>
+
+<file path=ppt/slides/slide31.xml><?xml version="1.0" encoding="utf-8"?>
+<p:sld xmlns:a="http://schemas.openxmlformats.org/drawingml/2006/main" xmlns:r="http://schemas.openxmlformats.org/officeDocument/2006/relationships" xmlns:p="http://schemas.openxmlformats.org/presentationml/2006/main">
+  <p:cSld>
+    <p:spTree>
+      <p:nvGrpSpPr>
+        <p:cNvPr id="1" name=""/>
+        <p:cNvGrpSpPr/>
+        <p:nvPr/>
+      </p:nvGrpSpPr>
+      <p:grpSpPr>
+        <a:xfrm>
+          <a:off x="0" y="0"/>
+          <a:ext cx="0" cy="0"/>
+          <a:chOff x="0" y="0"/>
+          <a:chExt cx="0" cy="0"/>
+        </a:xfrm>
+      </p:grpSpPr>
+      <p:sp>
+        <p:nvSpPr>
+          <p:cNvPr id="17410" name="Text Box 2"/>
+          <p:cNvSpPr txBox="1">
+            <a:spLocks noChangeArrowheads="1"/>
+          </p:cNvSpPr>
+          <p:nvPr/>
+        </p:nvSpPr>
+        <p:spPr bwMode="auto">
+          <a:xfrm>
+            <a:off x="1331913" y="692150"/>
+            <a:ext cx="5472112" cy="519113"/>
+          </a:xfrm>
+          <a:prstGeom prst="rect">
+            <a:avLst/>
+          </a:prstGeom>
+          <a:noFill/>
+          <a:ln w="9525">
+            <a:noFill/>
+            <a:miter lim="800000"/>
+            <a:headEnd/>
+            <a:tailEnd/>
+          </a:ln>
+          <a:effectLst/>
+        </p:spPr>
+        <p:txBody>
+          <a:bodyPr>
+            <a:spAutoFit/>
+          </a:bodyPr>
+          <a:lstStyle/>
+          <a:p>
+            <a:pPr>
+              <a:spcBef>
+                <a:spcPct val="50000"/>
+              </a:spcBef>
+            </a:pPr>
+            <a:r>
+              <a:rPr lang="th-TH"/>
+              <a:t>วิธีการหา </a:t>
+            </a:r>
+            <a:r>
+              <a:rPr lang="en-US"/>
+              <a:t>Highest Degree Node</a:t>
+            </a:r>
+            <a:r>
+              <a:rPr lang="th-TH"/>
+              <a:t> </a:t>
+            </a:r>
+          </a:p>
+        </p:txBody>
+      </p:sp>
+      <p:pic>
+        <p:nvPicPr>
+          <p:cNvPr id="17411" name="Picture 3"/>
+          <p:cNvPicPr>
+            <a:picLocks noChangeAspect="1" noChangeArrowheads="1"/>
+          </p:cNvPicPr>
+          <p:nvPr/>
+        </p:nvPicPr>
+        <p:blipFill>
+          <a:blip r:embed="rId2"/>
+          <a:srcRect/>
+          <a:stretch>
+            <a:fillRect/>
+          </a:stretch>
+        </p:blipFill>
+        <p:spPr bwMode="auto">
+          <a:xfrm>
+            <a:off x="2051050" y="1268413"/>
+            <a:ext cx="4838700" cy="5057775"/>
+          </a:xfrm>
+          <a:prstGeom prst="rect">
+            <a:avLst/>
+          </a:prstGeom>
+          <a:noFill/>
+          <a:ln w="9525">
+            <a:noFill/>
+            <a:miter lim="800000"/>
+            <a:headEnd/>
+            <a:tailEnd/>
+          </a:ln>
+          <a:effectLst/>
+        </p:spPr>
+      </p:pic>
+    </p:spTree>
+  </p:cSld>
+  <p:clrMapOvr>
+    <a:masterClrMapping/>
+  </p:clrMapOvr>
+</p:sld>
+</file>
+
+<file path=ppt/slides/slide32.xml><?xml version="1.0" encoding="utf-8"?>
+<p:sld xmlns:a="http://schemas.openxmlformats.org/drawingml/2006/main" xmlns:r="http://schemas.openxmlformats.org/officeDocument/2006/relationships" xmlns:p="http://schemas.openxmlformats.org/presentationml/2006/main">
+  <p:cSld>
+    <p:spTree>
+      <p:nvGrpSpPr>
+        <p:cNvPr id="1" name=""/>
+        <p:cNvGrpSpPr/>
+        <p:nvPr/>
+      </p:nvGrpSpPr>
+      <p:grpSpPr>
+        <a:xfrm>
+          <a:off x="0" y="0"/>
+          <a:ext cx="0" cy="0"/>
+          <a:chOff x="0" y="0"/>
+          <a:chExt cx="0" cy="0"/>
+        </a:xfrm>
+      </p:grpSpPr>
+      <p:pic>
+        <p:nvPicPr>
+          <p:cNvPr id="16386" name="Picture 2"/>
+          <p:cNvPicPr>
+            <a:picLocks noChangeAspect="1" noChangeArrowheads="1"/>
+          </p:cNvPicPr>
+          <p:nvPr/>
+        </p:nvPicPr>
+        <p:blipFill>
+          <a:blip r:embed="rId2"/>
+          <a:srcRect/>
+          <a:stretch>
+            <a:fillRect/>
+          </a:stretch>
+        </p:blipFill>
+        <p:spPr bwMode="auto">
+          <a:xfrm>
+            <a:off x="1908175" y="692150"/>
+            <a:ext cx="4838700" cy="5057775"/>
+          </a:xfrm>
+          <a:prstGeom prst="rect">
+            <a:avLst/>
+          </a:prstGeom>
+          <a:noFill/>
+          <a:ln w="9525">
+            <a:noFill/>
+            <a:miter lim="800000"/>
+            <a:headEnd/>
+            <a:tailEnd/>
+          </a:ln>
+          <a:effectLst/>
+        </p:spPr>
+      </p:pic>
+      <p:sp>
+        <p:nvSpPr>
+          <p:cNvPr id="16387" name="Text Box 3"/>
+          <p:cNvSpPr txBox="1">
+            <a:spLocks noChangeArrowheads="1"/>
+          </p:cNvSpPr>
+          <p:nvPr/>
+        </p:nvSpPr>
+        <p:spPr bwMode="auto">
+          <a:xfrm>
+            <a:off x="684213" y="5949950"/>
+            <a:ext cx="6624637" cy="519113"/>
+          </a:xfrm>
+          <a:prstGeom prst="rect">
+            <a:avLst/>
+          </a:prstGeom>
+          <a:noFill/>
+          <a:ln w="9525">
+            <a:noFill/>
+            <a:miter lim="800000"/>
+            <a:headEnd/>
+            <a:tailEnd/>
+          </a:ln>
+          <a:effectLst/>
+        </p:spPr>
+        <p:txBody>
+          <a:bodyPr>
+            <a:spAutoFit/>
+          </a:bodyPr>
+          <a:lstStyle/>
+          <a:p>
+            <a:pPr>
+              <a:spcBef>
+                <a:spcPct val="50000"/>
+              </a:spcBef>
+            </a:pPr>
+            <a:r>
+              <a:rPr lang="th-TH"/>
+              <a:t>แสดงผลลัพท์</a:t>
+            </a:r>
+          </a:p>
+        </p:txBody>
+      </p:sp>
+    </p:spTree>
+  </p:cSld>
+  <p:clrMapOvr>
+    <a:masterClrMapping/>
+  </p:clrMapOvr>
+</p:sld>
+</file>
+
+<file path=ppt/slides/slide33.xml><?xml version="1.0" encoding="utf-8"?>
+<p:sld xmlns:a="http://schemas.openxmlformats.org/drawingml/2006/main" xmlns:r="http://schemas.openxmlformats.org/officeDocument/2006/relationships" xmlns:p="http://schemas.openxmlformats.org/presentationml/2006/main">
+  <p:cSld>
+    <p:spTree>
+      <p:nvGrpSpPr>
+        <p:cNvPr id="1" name=""/>
+        <p:cNvGrpSpPr/>
+        <p:nvPr/>
+      </p:nvGrpSpPr>
+      <p:grpSpPr>
+        <a:xfrm>
+          <a:off x="0" y="0"/>
+          <a:ext cx="0" cy="0"/>
+          <a:chOff x="0" y="0"/>
+          <a:chExt cx="0" cy="0"/>
+        </a:xfrm>
+      </p:grpSpPr>
+      <p:pic>
+        <p:nvPicPr>
+          <p:cNvPr id="22532" name="Picture 4"/>
+          <p:cNvPicPr>
+            <a:picLocks noChangeAspect="1" noChangeArrowheads="1"/>
+          </p:cNvPicPr>
+          <p:nvPr/>
+        </p:nvPicPr>
+        <p:blipFill>
+          <a:blip r:embed="rId2"/>
+          <a:srcRect/>
+          <a:stretch>
+            <a:fillRect/>
+          </a:stretch>
+        </p:blipFill>
+        <p:spPr bwMode="auto">
+          <a:xfrm>
+            <a:off x="2484438" y="1341438"/>
+            <a:ext cx="4838700" cy="5057775"/>
+          </a:xfrm>
+          <a:prstGeom prst="rect">
+            <a:avLst/>
+          </a:prstGeom>
+          <a:noFill/>
+          <a:ln w="9525">
+            <a:noFill/>
+            <a:miter lim="800000"/>
+            <a:headEnd/>
+            <a:tailEnd/>
+          </a:ln>
+          <a:effectLst/>
+        </p:spPr>
+      </p:pic>
+      <p:sp>
+        <p:nvSpPr>
+          <p:cNvPr id="22533" name="Text Box 5"/>
+          <p:cNvSpPr txBox="1">
+            <a:spLocks noChangeArrowheads="1"/>
+          </p:cNvSpPr>
+          <p:nvPr/>
+        </p:nvSpPr>
+        <p:spPr bwMode="auto">
+          <a:xfrm>
+            <a:off x="611188" y="476250"/>
+            <a:ext cx="5832475" cy="519113"/>
+          </a:xfrm>
+          <a:prstGeom prst="rect">
+            <a:avLst/>
+          </a:prstGeom>
+          <a:noFill/>
+          <a:ln w="9525">
+            <a:noFill/>
+            <a:miter lim="800000"/>
+            <a:headEnd/>
+            <a:tailEnd/>
+          </a:ln>
+          <a:effectLst/>
+        </p:spPr>
+        <p:txBody>
+          <a:bodyPr>
+            <a:spAutoFit/>
+          </a:bodyPr>
+          <a:lstStyle/>
+          <a:p>
+            <a:pPr>
+              <a:spcBef>
+                <a:spcPct val="50000"/>
+              </a:spcBef>
+            </a:pPr>
+            <a:r>
+              <a:rPr lang="th-TH"/>
+              <a:t>วิธีการหา </a:t>
+            </a:r>
+            <a:r>
+              <a:rPr lang="en-US"/>
+              <a:t>Breadth first traversal tree</a:t>
+            </a:r>
+            <a:endParaRPr lang="th-TH"/>
+          </a:p>
+        </p:txBody>
+      </p:sp>
+    </p:spTree>
+  </p:cSld>
+  <p:clrMapOvr>
+    <a:masterClrMapping/>
+  </p:clrMapOvr>
+</p:sld>
+</file>
+
+<file path=ppt/slides/slide34.xml><?xml version="1.0" encoding="utf-8"?>
+<p:sld xmlns:a="http://schemas.openxmlformats.org/drawingml/2006/main" xmlns:r="http://schemas.openxmlformats.org/officeDocument/2006/relationships" xmlns:p="http://schemas.openxmlformats.org/presentationml/2006/main">
+  <p:cSld>
+    <p:spTree>
+      <p:nvGrpSpPr>
+        <p:cNvPr id="1" name=""/>
+        <p:cNvGrpSpPr/>
+        <p:nvPr/>
+      </p:nvGrpSpPr>
+      <p:grpSpPr>
+        <a:xfrm>
+          <a:off x="0" y="0"/>
+          <a:ext cx="0" cy="0"/>
+          <a:chOff x="0" y="0"/>
+          <a:chExt cx="0" cy="0"/>
+        </a:xfrm>
+      </p:grpSpPr>
+      <p:pic>
+        <p:nvPicPr>
           <p:cNvPr id="15363" name="Picture 3"/>
           <p:cNvPicPr>
             <a:picLocks noChangeAspect="1" noChangeArrowheads="1"/>
@@ -4694,7 +6135,7 @@
 </p:sld>
 </file>
 
-<file path=ppt/slides/slide21.xml><?xml version="1.0" encoding="utf-8"?>
+<file path=ppt/slides/slide35.xml><?xml version="1.0" encoding="utf-8"?>
 <p:sld xmlns:a="http://schemas.openxmlformats.org/drawingml/2006/main" xmlns:r="http://schemas.openxmlformats.org/officeDocument/2006/relationships" xmlns:p="http://schemas.openxmlformats.org/presentationml/2006/main">
   <p:cSld>
     <p:spTree>
@@ -4795,107 +6236,6 @@
 </p:sld>
 </file>
 
-<file path=ppt/slides/slide3.xml><?xml version="1.0" encoding="utf-8"?>
-<p:sld xmlns:a="http://schemas.openxmlformats.org/drawingml/2006/main" xmlns:r="http://schemas.openxmlformats.org/officeDocument/2006/relationships" xmlns:p="http://schemas.openxmlformats.org/presentationml/2006/main">
-  <p:cSld>
-    <p:spTree>
-      <p:nvGrpSpPr>
-        <p:cNvPr id="1" name=""/>
-        <p:cNvGrpSpPr/>
-        <p:nvPr/>
-      </p:nvGrpSpPr>
-      <p:grpSpPr>
-        <a:xfrm>
-          <a:off x="0" y="0"/>
-          <a:ext cx="0" cy="0"/>
-          <a:chOff x="0" y="0"/>
-          <a:chExt cx="0" cy="0"/>
-        </a:xfrm>
-      </p:grpSpPr>
-      <p:pic>
-        <p:nvPicPr>
-          <p:cNvPr id="2053" name="Picture 5"/>
-          <p:cNvPicPr>
-            <a:picLocks noChangeAspect="1" noChangeArrowheads="1"/>
-          </p:cNvPicPr>
-          <p:nvPr/>
-        </p:nvPicPr>
-        <p:blipFill>
-          <a:blip r:embed="rId2"/>
-          <a:srcRect/>
-          <a:stretch>
-            <a:fillRect/>
-          </a:stretch>
-        </p:blipFill>
-        <p:spPr bwMode="auto">
-          <a:xfrm>
-            <a:off x="1547813" y="908050"/>
-            <a:ext cx="4838700" cy="5086350"/>
-          </a:xfrm>
-          <a:prstGeom prst="rect">
-            <a:avLst/>
-          </a:prstGeom>
-          <a:noFill/>
-          <a:ln w="9525">
-            <a:noFill/>
-            <a:miter lim="800000"/>
-            <a:headEnd/>
-            <a:tailEnd/>
-          </a:ln>
-          <a:effectLst/>
-        </p:spPr>
-      </p:pic>
-      <p:sp>
-        <p:nvSpPr>
-          <p:cNvPr id="2054" name="Text Box 6"/>
-          <p:cNvSpPr txBox="1">
-            <a:spLocks noChangeArrowheads="1"/>
-          </p:cNvSpPr>
-          <p:nvPr/>
-        </p:nvSpPr>
-        <p:spPr bwMode="auto">
-          <a:xfrm>
-            <a:off x="539750" y="404813"/>
-            <a:ext cx="6192838" cy="519112"/>
-          </a:xfrm>
-          <a:prstGeom prst="rect">
-            <a:avLst/>
-          </a:prstGeom>
-          <a:noFill/>
-          <a:ln w="9525">
-            <a:noFill/>
-            <a:miter lim="800000"/>
-            <a:headEnd/>
-            <a:tailEnd/>
-          </a:ln>
-          <a:effectLst/>
-        </p:spPr>
-        <p:txBody>
-          <a:bodyPr>
-            <a:spAutoFit/>
-          </a:bodyPr>
-          <a:lstStyle/>
-          <a:p>
-            <a:pPr>
-              <a:spcBef>
-                <a:spcPct val="50000"/>
-              </a:spcBef>
-            </a:pPr>
-            <a:r>
-              <a:rPr lang="th-TH" dirty="0"/>
-              <a:t>วิธีการใช้งานโปรแกรม</a:t>
-            </a:r>
-          </a:p>
-        </p:txBody>
-      </p:sp>
-    </p:spTree>
-  </p:cSld>
-  <p:clrMapOvr>
-    <a:masterClrMapping/>
-  </p:clrMapOvr>
-</p:sld>
-</file>
-
 <file path=ppt/slides/slide4.xml><?xml version="1.0" encoding="utf-8"?>
 <p:sld xmlns:a="http://schemas.openxmlformats.org/drawingml/2006/main" xmlns:r="http://schemas.openxmlformats.org/officeDocument/2006/relationships" xmlns:p="http://schemas.openxmlformats.org/presentationml/2006/main">
   <p:cSld>
@@ -4915,7 +6255,7 @@
       </p:grpSpPr>
       <p:pic>
         <p:nvPicPr>
-          <p:cNvPr id="3079" name="Picture 7"/>
+          <p:cNvPr id="2" name="Picture 4"/>
           <p:cNvPicPr>
             <a:picLocks noChangeAspect="1" noChangeArrowheads="1"/>
           </p:cNvPicPr>
@@ -4930,7 +6270,7 @@
         </p:blipFill>
         <p:spPr bwMode="auto">
           <a:xfrm>
-            <a:off x="1979613" y="1125538"/>
+            <a:off x="2152650" y="885825"/>
             <a:ext cx="4838700" cy="5086350"/>
           </a:xfrm>
           <a:prstGeom prst="rect">
@@ -4946,18 +6286,25 @@
           <a:effectLst/>
         </p:spPr>
       </p:pic>
-      <p:sp>
-        <p:nvSpPr>
-          <p:cNvPr id="3080" name="Text Box 8"/>
-          <p:cNvSpPr txBox="1">
-            <a:spLocks noChangeArrowheads="1"/>
-          </p:cNvSpPr>
+      <p:pic>
+        <p:nvPicPr>
+          <p:cNvPr id="3" name="Picture 5"/>
+          <p:cNvPicPr>
+            <a:picLocks noChangeAspect="1" noChangeArrowheads="1"/>
+          </p:cNvPicPr>
           <p:nvPr/>
-        </p:nvSpPr>
+        </p:nvPicPr>
+        <p:blipFill>
+          <a:blip r:embed="rId3"/>
+          <a:srcRect/>
+          <a:stretch>
+            <a:fillRect/>
+          </a:stretch>
+        </p:blipFill>
         <p:spPr bwMode="auto">
           <a:xfrm>
-            <a:off x="468313" y="5949950"/>
-            <a:ext cx="6480175" cy="519113"/>
+            <a:off x="3643306" y="2500306"/>
+            <a:ext cx="1981200" cy="1276350"/>
           </a:xfrm>
           <a:prstGeom prst="rect">
             <a:avLst/>
@@ -4971,69 +6318,7 @@
           </a:ln>
           <a:effectLst/>
         </p:spPr>
-        <p:txBody>
-          <a:bodyPr>
-            <a:spAutoFit/>
-          </a:bodyPr>
-          <a:lstStyle/>
-          <a:p>
-            <a:pPr>
-              <a:spcBef>
-                <a:spcPct val="50000"/>
-              </a:spcBef>
-            </a:pPr>
-            <a:endParaRPr lang="th-TH"/>
-          </a:p>
-        </p:txBody>
-      </p:sp>
-      <p:sp>
-        <p:nvSpPr>
-          <p:cNvPr id="3081" name="Text Box 9"/>
-          <p:cNvSpPr txBox="1">
-            <a:spLocks noChangeArrowheads="1"/>
-          </p:cNvSpPr>
-          <p:nvPr/>
-        </p:nvSpPr>
-        <p:spPr bwMode="auto">
-          <a:xfrm>
-            <a:off x="468313" y="260350"/>
-            <a:ext cx="6264275" cy="519113"/>
-          </a:xfrm>
-          <a:prstGeom prst="rect">
-            <a:avLst/>
-          </a:prstGeom>
-          <a:noFill/>
-          <a:ln w="9525">
-            <a:noFill/>
-            <a:miter lim="800000"/>
-            <a:headEnd/>
-            <a:tailEnd/>
-          </a:ln>
-          <a:effectLst/>
-        </p:spPr>
-        <p:txBody>
-          <a:bodyPr>
-            <a:spAutoFit/>
-          </a:bodyPr>
-          <a:lstStyle/>
-          <a:p>
-            <a:pPr>
-              <a:spcBef>
-                <a:spcPct val="50000"/>
-              </a:spcBef>
-            </a:pPr>
-            <a:r>
-              <a:rPr lang="th-TH"/>
-              <a:t>วิธีการเปิดชิ้นงานไปที่ </a:t>
-            </a:r>
-            <a:r>
-              <a:rPr lang="en-US"/>
-              <a:t>file / Open file</a:t>
-            </a:r>
-            <a:endParaRPr lang="th-TH"/>
-          </a:p>
-        </p:txBody>
-      </p:sp>
+      </p:pic>
     </p:spTree>
   </p:cSld>
   <p:clrMapOvr>
@@ -5061,7 +6346,7 @@
       </p:grpSpPr>
       <p:pic>
         <p:nvPicPr>
-          <p:cNvPr id="4101" name="Picture 5"/>
+          <p:cNvPr id="2" name="Picture 3"/>
           <p:cNvPicPr>
             <a:picLocks noChangeAspect="1" noChangeArrowheads="1"/>
           </p:cNvPicPr>
@@ -5076,8 +6361,8 @@
         </p:blipFill>
         <p:spPr bwMode="auto">
           <a:xfrm>
-            <a:off x="1042988" y="549275"/>
-            <a:ext cx="5362575" cy="3990975"/>
+            <a:off x="2152650" y="885825"/>
+            <a:ext cx="4838700" cy="5086350"/>
           </a:xfrm>
           <a:prstGeom prst="rect">
             <a:avLst/>
@@ -5092,62 +6377,6 @@
           <a:effectLst/>
         </p:spPr>
       </p:pic>
-      <p:sp>
-        <p:nvSpPr>
-          <p:cNvPr id="4103" name="Text Box 7"/>
-          <p:cNvSpPr txBox="1">
-            <a:spLocks noChangeArrowheads="1"/>
-          </p:cNvSpPr>
-          <p:nvPr/>
-        </p:nvSpPr>
-        <p:spPr bwMode="auto">
-          <a:xfrm>
-            <a:off x="323850" y="5445125"/>
-            <a:ext cx="8280400" cy="519113"/>
-          </a:xfrm>
-          <a:prstGeom prst="rect">
-            <a:avLst/>
-          </a:prstGeom>
-          <a:noFill/>
-          <a:ln w="9525">
-            <a:noFill/>
-            <a:miter lim="800000"/>
-            <a:headEnd/>
-            <a:tailEnd/>
-          </a:ln>
-          <a:effectLst/>
-        </p:spPr>
-        <p:txBody>
-          <a:bodyPr>
-            <a:spAutoFit/>
-          </a:bodyPr>
-          <a:lstStyle/>
-          <a:p>
-            <a:pPr>
-              <a:spcBef>
-                <a:spcPct val="50000"/>
-              </a:spcBef>
-            </a:pPr>
-            <a:r>
-              <a:rPr lang="th-TH"/>
-              <a:t>ไปที่โฟเดอร์ </a:t>
-            </a:r>
-            <a:r>
-              <a:rPr lang="en-US"/>
-              <a:t>inputGraphML </a:t>
-            </a:r>
-            <a:r>
-              <a:rPr lang="th-TH"/>
-              <a:t>เลือก </a:t>
-            </a:r>
-            <a:r>
-              <a:rPr lang="en-US"/>
-              <a:t>activitydiagram1</a:t>
-            </a:r>
-            <a:endParaRPr lang="th-TH"/>
-          </a:p>
-        </p:txBody>
-      </p:sp>
     </p:spTree>
   </p:cSld>
   <p:clrMapOvr>
@@ -5175,7 +6404,7 @@
       </p:grpSpPr>
       <p:pic>
         <p:nvPicPr>
-          <p:cNvPr id="5124" name="Picture 4"/>
+          <p:cNvPr id="2050" name="Picture 2"/>
           <p:cNvPicPr>
             <a:picLocks noChangeAspect="1" noChangeArrowheads="1"/>
           </p:cNvPicPr>
@@ -5190,7 +6419,7 @@
         </p:blipFill>
         <p:spPr bwMode="auto">
           <a:xfrm>
-            <a:off x="827088" y="404813"/>
+            <a:off x="2152650" y="885825"/>
             <a:ext cx="4838700" cy="5086350"/>
           </a:xfrm>
           <a:prstGeom prst="rect">
@@ -5206,49 +6435,6 @@
           <a:effectLst/>
         </p:spPr>
       </p:pic>
-      <p:sp>
-        <p:nvSpPr>
-          <p:cNvPr id="5125" name="Text Box 5"/>
-          <p:cNvSpPr txBox="1">
-            <a:spLocks noChangeArrowheads="1"/>
-          </p:cNvSpPr>
-          <p:nvPr/>
-        </p:nvSpPr>
-        <p:spPr bwMode="auto">
-          <a:xfrm>
-            <a:off x="395288" y="6092825"/>
-            <a:ext cx="7416800" cy="519113"/>
-          </a:xfrm>
-          <a:prstGeom prst="rect">
-            <a:avLst/>
-          </a:prstGeom>
-          <a:noFill/>
-          <a:ln w="9525">
-            <a:noFill/>
-            <a:miter lim="800000"/>
-            <a:headEnd/>
-            <a:tailEnd/>
-          </a:ln>
-          <a:effectLst/>
-        </p:spPr>
-        <p:txBody>
-          <a:bodyPr>
-            <a:spAutoFit/>
-          </a:bodyPr>
-          <a:lstStyle/>
-          <a:p>
-            <a:pPr>
-              <a:spcBef>
-                <a:spcPct val="50000"/>
-              </a:spcBef>
-            </a:pPr>
-            <a:r>
-              <a:rPr lang="th-TH"/>
-              <a:t>ผลลัพย์ที่ได้จากการสร้างชิ้นงาน</a:t>
-            </a:r>
-          </a:p>
-        </p:txBody>
-      </p:sp>
     </p:spTree>
   </p:cSld>
   <p:clrMapOvr>
@@ -5276,7 +6462,7 @@
       </p:grpSpPr>
       <p:pic>
         <p:nvPicPr>
-          <p:cNvPr id="11266" name="Picture 2"/>
+          <p:cNvPr id="4" name="Picture 3"/>
           <p:cNvPicPr>
             <a:picLocks noChangeAspect="1" noChangeArrowheads="1"/>
           </p:cNvPicPr>
@@ -5291,8 +6477,8 @@
         </p:blipFill>
         <p:spPr bwMode="auto">
           <a:xfrm>
-            <a:off x="755650" y="260350"/>
-            <a:ext cx="4838700" cy="5057775"/>
+            <a:off x="1571604" y="928670"/>
+            <a:ext cx="4838700" cy="5086350"/>
           </a:xfrm>
           <a:prstGeom prst="rect">
             <a:avLst/>
@@ -5307,18 +6493,25 @@
           <a:effectLst/>
         </p:spPr>
       </p:pic>
-      <p:sp>
-        <p:nvSpPr>
-          <p:cNvPr id="11267" name="Text Box 3"/>
-          <p:cNvSpPr txBox="1">
-            <a:spLocks noChangeArrowheads="1"/>
-          </p:cNvSpPr>
+      <p:pic>
+        <p:nvPicPr>
+          <p:cNvPr id="2" name="Picture 2"/>
+          <p:cNvPicPr>
+            <a:picLocks noChangeAspect="1" noChangeArrowheads="1"/>
+          </p:cNvPicPr>
           <p:nvPr/>
-        </p:nvSpPr>
+        </p:nvPicPr>
+        <p:blipFill>
+          <a:blip r:embed="rId3"/>
+          <a:srcRect/>
+          <a:stretch>
+            <a:fillRect/>
+          </a:stretch>
+        </p:blipFill>
         <p:spPr bwMode="auto">
           <a:xfrm>
-            <a:off x="395288" y="5794375"/>
-            <a:ext cx="5329237" cy="519113"/>
+            <a:off x="4859338" y="1125538"/>
+            <a:ext cx="1981200" cy="1276350"/>
           </a:xfrm>
           <a:prstGeom prst="rect">
             <a:avLst/>
@@ -5332,24 +6525,40 @@
           </a:ln>
           <a:effectLst/>
         </p:spPr>
-        <p:txBody>
-          <a:bodyPr>
-            <a:spAutoFit/>
-          </a:bodyPr>
-          <a:lstStyle/>
-          <a:p>
-            <a:pPr>
-              <a:spcBef>
-                <a:spcPct val="50000"/>
-              </a:spcBef>
-            </a:pPr>
-            <a:r>
-              <a:rPr lang="th-TH"/>
-              <a:t>จัดแต่งให้สวยงาม</a:t>
-            </a:r>
-          </a:p>
-        </p:txBody>
-      </p:sp>
+      </p:pic>
+      <p:pic>
+        <p:nvPicPr>
+          <p:cNvPr id="3" name="Picture 8"/>
+          <p:cNvPicPr>
+            <a:picLocks noChangeAspect="1" noChangeArrowheads="1"/>
+          </p:cNvPicPr>
+          <p:nvPr/>
+        </p:nvPicPr>
+        <p:blipFill>
+          <a:blip r:embed="rId4"/>
+          <a:srcRect/>
+          <a:stretch>
+            <a:fillRect/>
+          </a:stretch>
+        </p:blipFill>
+        <p:spPr bwMode="auto">
+          <a:xfrm>
+            <a:off x="4859338" y="2924175"/>
+            <a:ext cx="1981200" cy="1276350"/>
+          </a:xfrm>
+          <a:prstGeom prst="rect">
+            <a:avLst/>
+          </a:prstGeom>
+          <a:noFill/>
+          <a:ln w="9525">
+            <a:noFill/>
+            <a:miter lim="800000"/>
+            <a:headEnd/>
+            <a:tailEnd/>
+          </a:ln>
+          <a:effectLst/>
+        </p:spPr>
+      </p:pic>
     </p:spTree>
   </p:cSld>
   <p:clrMapOvr>
@@ -5377,7 +6586,7 @@
       </p:grpSpPr>
       <p:pic>
         <p:nvPicPr>
-          <p:cNvPr id="10242" name="Picture 2"/>
+          <p:cNvPr id="3074" name="Picture 2"/>
           <p:cNvPicPr>
             <a:picLocks noChangeAspect="1" noChangeArrowheads="1"/>
           </p:cNvPicPr>
@@ -5392,8 +6601,8 @@
         </p:blipFill>
         <p:spPr bwMode="auto">
           <a:xfrm>
-            <a:off x="971550" y="476250"/>
-            <a:ext cx="4838700" cy="5057775"/>
+            <a:off x="2152650" y="885825"/>
+            <a:ext cx="4838700" cy="5086350"/>
           </a:xfrm>
           <a:prstGeom prst="rect">
             <a:avLst/>
@@ -5408,49 +6617,6 @@
           <a:effectLst/>
         </p:spPr>
       </p:pic>
-      <p:sp>
-        <p:nvSpPr>
-          <p:cNvPr id="10243" name="Text Box 3"/>
-          <p:cNvSpPr txBox="1">
-            <a:spLocks noChangeArrowheads="1"/>
-          </p:cNvSpPr>
-          <p:nvPr/>
-        </p:nvSpPr>
-        <p:spPr bwMode="auto">
-          <a:xfrm>
-            <a:off x="611188" y="6165850"/>
-            <a:ext cx="4465637" cy="519113"/>
-          </a:xfrm>
-          <a:prstGeom prst="rect">
-            <a:avLst/>
-          </a:prstGeom>
-          <a:noFill/>
-          <a:ln w="9525">
-            <a:noFill/>
-            <a:miter lim="800000"/>
-            <a:headEnd/>
-            <a:tailEnd/>
-          </a:ln>
-          <a:effectLst/>
-        </p:spPr>
-        <p:txBody>
-          <a:bodyPr>
-            <a:spAutoFit/>
-          </a:bodyPr>
-          <a:lstStyle/>
-          <a:p>
-            <a:pPr>
-              <a:spcBef>
-                <a:spcPct val="50000"/>
-              </a:spcBef>
-            </a:pPr>
-            <a:r>
-              <a:rPr lang="th-TH"/>
-              <a:t>วิธีการเพิ่มโหนด</a:t>
-            </a:r>
-          </a:p>
-        </p:txBody>
-      </p:sp>
     </p:spTree>
   </p:cSld>
   <p:clrMapOvr>
@@ -5478,7 +6644,7 @@
       </p:grpSpPr>
       <p:pic>
         <p:nvPicPr>
-          <p:cNvPr id="9219" name="Picture 3"/>
+          <p:cNvPr id="4098" name="Picture 2"/>
           <p:cNvPicPr>
             <a:picLocks noChangeAspect="1" noChangeArrowheads="1"/>
           </p:cNvPicPr>
@@ -5493,84 +6659,8 @@
         </p:blipFill>
         <p:spPr bwMode="auto">
           <a:xfrm>
-            <a:off x="900113" y="260350"/>
-            <a:ext cx="4838700" cy="5057775"/>
-          </a:xfrm>
-          <a:prstGeom prst="rect">
-            <a:avLst/>
-          </a:prstGeom>
-          <a:noFill/>
-          <a:ln w="9525">
-            <a:noFill/>
-            <a:miter lim="800000"/>
-            <a:headEnd/>
-            <a:tailEnd/>
-          </a:ln>
-          <a:effectLst/>
-        </p:spPr>
-      </p:pic>
-      <p:sp>
-        <p:nvSpPr>
-          <p:cNvPr id="9220" name="Text Box 4"/>
-          <p:cNvSpPr txBox="1">
-            <a:spLocks noChangeArrowheads="1"/>
-          </p:cNvSpPr>
-          <p:nvPr/>
-        </p:nvSpPr>
-        <p:spPr bwMode="auto">
-          <a:xfrm>
-            <a:off x="755650" y="6092825"/>
-            <a:ext cx="6840538" cy="519113"/>
-          </a:xfrm>
-          <a:prstGeom prst="rect">
-            <a:avLst/>
-          </a:prstGeom>
-          <a:noFill/>
-          <a:ln w="9525">
-            <a:noFill/>
-            <a:miter lim="800000"/>
-            <a:headEnd/>
-            <a:tailEnd/>
-          </a:ln>
-          <a:effectLst/>
-        </p:spPr>
-        <p:txBody>
-          <a:bodyPr>
-            <a:spAutoFit/>
-          </a:bodyPr>
-          <a:lstStyle/>
-          <a:p>
-            <a:pPr>
-              <a:spcBef>
-                <a:spcPct val="50000"/>
-              </a:spcBef>
-            </a:pPr>
-            <a:r>
-              <a:rPr lang="th-TH"/>
-              <a:t>ป้อนข้อมูลที่ต้องการ</a:t>
-            </a:r>
-          </a:p>
-        </p:txBody>
-      </p:sp>
-      <p:pic>
-        <p:nvPicPr>
-          <p:cNvPr id="9221" name="Picture 5"/>
-          <p:cNvPicPr>
-            <a:picLocks noChangeAspect="1" noChangeArrowheads="1"/>
-          </p:cNvPicPr>
-          <p:nvPr/>
-        </p:nvPicPr>
-        <p:blipFill>
-          <a:blip r:embed="rId3"/>
-          <a:srcRect/>
-          <a:stretch>
-            <a:fillRect/>
-          </a:stretch>
-        </p:blipFill>
-        <p:spPr bwMode="auto">
-          <a:xfrm>
-            <a:off x="2771775" y="476250"/>
-            <a:ext cx="1981200" cy="1276350"/>
+            <a:off x="2152650" y="885825"/>
+            <a:ext cx="4838700" cy="5086350"/>
           </a:xfrm>
           <a:prstGeom prst="rect">
             <a:avLst/>

</xml_diff>

<commit_message>
lession 4 - algorithm -- Breadth first search
</commit_message>
<xml_diff>
--- a/doc/uiprogram.pptx
+++ b/doc/uiprogram.pptx
@@ -25,21 +25,28 @@
     <p:sldId id="257" r:id="rId19"/>
     <p:sldId id="258" r:id="rId20"/>
     <p:sldId id="259" r:id="rId21"/>
-    <p:sldId id="260" r:id="rId22"/>
-    <p:sldId id="261" r:id="rId23"/>
-    <p:sldId id="262" r:id="rId24"/>
-    <p:sldId id="263" r:id="rId25"/>
-    <p:sldId id="264" r:id="rId26"/>
-    <p:sldId id="265" r:id="rId27"/>
-    <p:sldId id="266" r:id="rId28"/>
-    <p:sldId id="267" r:id="rId29"/>
-    <p:sldId id="268" r:id="rId30"/>
-    <p:sldId id="269" r:id="rId31"/>
-    <p:sldId id="270" r:id="rId32"/>
-    <p:sldId id="271" r:id="rId33"/>
-    <p:sldId id="274" r:id="rId34"/>
-    <p:sldId id="272" r:id="rId35"/>
-    <p:sldId id="273" r:id="rId36"/>
+    <p:sldId id="291" r:id="rId22"/>
+    <p:sldId id="292" r:id="rId23"/>
+    <p:sldId id="293" r:id="rId24"/>
+    <p:sldId id="294" r:id="rId25"/>
+    <p:sldId id="260" r:id="rId26"/>
+    <p:sldId id="261" r:id="rId27"/>
+    <p:sldId id="262" r:id="rId28"/>
+    <p:sldId id="263" r:id="rId29"/>
+    <p:sldId id="264" r:id="rId30"/>
+    <p:sldId id="265" r:id="rId31"/>
+    <p:sldId id="266" r:id="rId32"/>
+    <p:sldId id="267" r:id="rId33"/>
+    <p:sldId id="268" r:id="rId34"/>
+    <p:sldId id="269" r:id="rId35"/>
+    <p:sldId id="270" r:id="rId36"/>
+    <p:sldId id="271" r:id="rId37"/>
+    <p:sldId id="295" r:id="rId38"/>
+    <p:sldId id="296" r:id="rId39"/>
+    <p:sldId id="297" r:id="rId40"/>
+    <p:sldId id="274" r:id="rId41"/>
+    <p:sldId id="272" r:id="rId42"/>
+    <p:sldId id="273" r:id="rId43"/>
   </p:sldIdLst>
   <p:sldSz cx="9144000" cy="6858000" type="screen4x3"/>
   <p:notesSz cx="6858000" cy="9144000"/>
@@ -4484,6 +4491,205 @@
       </p:grpSpPr>
       <p:pic>
         <p:nvPicPr>
+          <p:cNvPr id="1027" name="Picture 3"/>
+          <p:cNvPicPr>
+            <a:picLocks noChangeAspect="1" noChangeArrowheads="1"/>
+          </p:cNvPicPr>
+          <p:nvPr/>
+        </p:nvPicPr>
+        <p:blipFill>
+          <a:blip r:embed="rId2"/>
+          <a:srcRect/>
+          <a:stretch>
+            <a:fillRect/>
+          </a:stretch>
+        </p:blipFill>
+        <p:spPr bwMode="auto">
+          <a:xfrm>
+            <a:off x="2214546" y="857232"/>
+            <a:ext cx="4838700" cy="5086350"/>
+          </a:xfrm>
+          <a:prstGeom prst="rect">
+            <a:avLst/>
+          </a:prstGeom>
+          <a:noFill/>
+          <a:ln w="9525">
+            <a:noFill/>
+            <a:miter lim="800000"/>
+            <a:headEnd/>
+            <a:tailEnd/>
+          </a:ln>
+          <a:effectLst/>
+        </p:spPr>
+      </p:pic>
+    </p:spTree>
+  </p:cSld>
+  <p:clrMapOvr>
+    <a:masterClrMapping/>
+  </p:clrMapOvr>
+</p:sld>
+</file>
+
+<file path=ppt/slides/slide22.xml><?xml version="1.0" encoding="utf-8"?>
+<p:sld xmlns:a="http://schemas.openxmlformats.org/drawingml/2006/main" xmlns:r="http://schemas.openxmlformats.org/officeDocument/2006/relationships" xmlns:p="http://schemas.openxmlformats.org/presentationml/2006/main">
+  <p:cSld>
+    <p:spTree>
+      <p:nvGrpSpPr>
+        <p:cNvPr id="1" name=""/>
+        <p:cNvGrpSpPr/>
+        <p:nvPr/>
+      </p:nvGrpSpPr>
+      <p:grpSpPr>
+        <a:xfrm>
+          <a:off x="0" y="0"/>
+          <a:ext cx="0" cy="0"/>
+          <a:chOff x="0" y="0"/>
+          <a:chExt cx="0" cy="0"/>
+        </a:xfrm>
+      </p:grpSpPr>
+      <p:pic>
+        <p:nvPicPr>
+          <p:cNvPr id="4" name="Picture 5"/>
+          <p:cNvPicPr>
+            <a:picLocks noChangeAspect="1" noChangeArrowheads="1"/>
+          </p:cNvPicPr>
+          <p:nvPr/>
+        </p:nvPicPr>
+        <p:blipFill>
+          <a:blip r:embed="rId2"/>
+          <a:srcRect/>
+          <a:stretch>
+            <a:fillRect/>
+          </a:stretch>
+        </p:blipFill>
+        <p:spPr bwMode="auto">
+          <a:xfrm>
+            <a:off x="2643174" y="928670"/>
+            <a:ext cx="4838700" cy="5086350"/>
+          </a:xfrm>
+          <a:prstGeom prst="rect">
+            <a:avLst/>
+          </a:prstGeom>
+          <a:noFill/>
+          <a:ln w="9525">
+            <a:noFill/>
+            <a:miter lim="800000"/>
+            <a:headEnd/>
+            <a:tailEnd/>
+          </a:ln>
+          <a:effectLst/>
+        </p:spPr>
+      </p:pic>
+      <p:pic>
+        <p:nvPicPr>
+          <p:cNvPr id="2050" name="Picture 2"/>
+          <p:cNvPicPr>
+            <a:picLocks noChangeAspect="1" noChangeArrowheads="1"/>
+          </p:cNvPicPr>
+          <p:nvPr/>
+        </p:nvPicPr>
+        <p:blipFill>
+          <a:blip r:embed="rId3"/>
+          <a:srcRect/>
+          <a:stretch>
+            <a:fillRect/>
+          </a:stretch>
+        </p:blipFill>
+        <p:spPr bwMode="auto">
+          <a:xfrm>
+            <a:off x="2309775" y="1449356"/>
+            <a:ext cx="5362575" cy="3990975"/>
+          </a:xfrm>
+          <a:prstGeom prst="rect">
+            <a:avLst/>
+          </a:prstGeom>
+          <a:noFill/>
+          <a:ln w="9525">
+            <a:noFill/>
+            <a:miter lim="800000"/>
+            <a:headEnd/>
+            <a:tailEnd/>
+          </a:ln>
+          <a:effectLst/>
+        </p:spPr>
+      </p:pic>
+    </p:spTree>
+  </p:cSld>
+  <p:clrMapOvr>
+    <a:masterClrMapping/>
+  </p:clrMapOvr>
+</p:sld>
+</file>
+
+<file path=ppt/slides/slide23.xml><?xml version="1.0" encoding="utf-8"?>
+<p:sld xmlns:a="http://schemas.openxmlformats.org/drawingml/2006/main" xmlns:r="http://schemas.openxmlformats.org/officeDocument/2006/relationships" xmlns:p="http://schemas.openxmlformats.org/presentationml/2006/main">
+  <p:cSld>
+    <p:spTree>
+      <p:nvGrpSpPr>
+        <p:cNvPr id="1" name=""/>
+        <p:cNvGrpSpPr/>
+        <p:nvPr/>
+      </p:nvGrpSpPr>
+      <p:grpSpPr>
+        <a:xfrm>
+          <a:off x="0" y="0"/>
+          <a:ext cx="0" cy="0"/>
+          <a:chOff x="0" y="0"/>
+          <a:chExt cx="0" cy="0"/>
+        </a:xfrm>
+      </p:grpSpPr>
+    </p:spTree>
+  </p:cSld>
+  <p:clrMapOvr>
+    <a:masterClrMapping/>
+  </p:clrMapOvr>
+</p:sld>
+</file>
+
+<file path=ppt/slides/slide24.xml><?xml version="1.0" encoding="utf-8"?>
+<p:sld xmlns:a="http://schemas.openxmlformats.org/drawingml/2006/main" xmlns:r="http://schemas.openxmlformats.org/officeDocument/2006/relationships" xmlns:p="http://schemas.openxmlformats.org/presentationml/2006/main">
+  <p:cSld>
+    <p:spTree>
+      <p:nvGrpSpPr>
+        <p:cNvPr id="1" name=""/>
+        <p:cNvGrpSpPr/>
+        <p:nvPr/>
+      </p:nvGrpSpPr>
+      <p:grpSpPr>
+        <a:xfrm>
+          <a:off x="0" y="0"/>
+          <a:ext cx="0" cy="0"/>
+          <a:chOff x="0" y="0"/>
+          <a:chExt cx="0" cy="0"/>
+        </a:xfrm>
+      </p:grpSpPr>
+    </p:spTree>
+  </p:cSld>
+  <p:clrMapOvr>
+    <a:masterClrMapping/>
+  </p:clrMapOvr>
+</p:sld>
+</file>
+
+<file path=ppt/slides/slide25.xml><?xml version="1.0" encoding="utf-8"?>
+<p:sld xmlns:a="http://schemas.openxmlformats.org/drawingml/2006/main" xmlns:r="http://schemas.openxmlformats.org/officeDocument/2006/relationships" xmlns:p="http://schemas.openxmlformats.org/presentationml/2006/main">
+  <p:cSld>
+    <p:spTree>
+      <p:nvGrpSpPr>
+        <p:cNvPr id="1" name=""/>
+        <p:cNvGrpSpPr/>
+        <p:nvPr/>
+      </p:nvGrpSpPr>
+      <p:grpSpPr>
+        <a:xfrm>
+          <a:off x="0" y="0"/>
+          <a:ext cx="0" cy="0"/>
+          <a:chOff x="0" y="0"/>
+          <a:chExt cx="0" cy="0"/>
+        </a:xfrm>
+      </p:grpSpPr>
+      <p:pic>
+        <p:nvPicPr>
           <p:cNvPr id="11266" name="Picture 2"/>
           <p:cNvPicPr>
             <a:picLocks noChangeAspect="1" noChangeArrowheads="1"/>
@@ -4566,7 +4772,7 @@
 </p:sld>
 </file>
 
-<file path=ppt/slides/slide22.xml><?xml version="1.0" encoding="utf-8"?>
+<file path=ppt/slides/slide26.xml><?xml version="1.0" encoding="utf-8"?>
 <p:sld xmlns:a="http://schemas.openxmlformats.org/drawingml/2006/main" xmlns:r="http://schemas.openxmlformats.org/officeDocument/2006/relationships" xmlns:p="http://schemas.openxmlformats.org/presentationml/2006/main">
   <p:cSld>
     <p:spTree>
@@ -4667,7 +4873,7 @@
 </p:sld>
 </file>
 
-<file path=ppt/slides/slide23.xml><?xml version="1.0" encoding="utf-8"?>
+<file path=ppt/slides/slide27.xml><?xml version="1.0" encoding="utf-8"?>
 <p:sld xmlns:a="http://schemas.openxmlformats.org/drawingml/2006/main" xmlns:r="http://schemas.openxmlformats.org/officeDocument/2006/relationships" xmlns:p="http://schemas.openxmlformats.org/presentationml/2006/main">
   <p:cSld>
     <p:spTree>
@@ -4801,7 +5007,7 @@
 </p:sld>
 </file>
 
-<file path=ppt/slides/slide24.xml><?xml version="1.0" encoding="utf-8"?>
+<file path=ppt/slides/slide28.xml><?xml version="1.0" encoding="utf-8"?>
 <p:sld xmlns:a="http://schemas.openxmlformats.org/drawingml/2006/main" xmlns:r="http://schemas.openxmlformats.org/officeDocument/2006/relationships" xmlns:p="http://schemas.openxmlformats.org/presentationml/2006/main">
   <p:cSld>
     <p:spTree>
@@ -4899,7 +5105,7 @@
 </p:sld>
 </file>
 
-<file path=ppt/slides/slide25.xml><?xml version="1.0" encoding="utf-8"?>
+<file path=ppt/slides/slide29.xml><?xml version="1.0" encoding="utf-8"?>
 <p:sld xmlns:a="http://schemas.openxmlformats.org/drawingml/2006/main" xmlns:r="http://schemas.openxmlformats.org/officeDocument/2006/relationships" xmlns:p="http://schemas.openxmlformats.org/presentationml/2006/main">
   <p:cSld>
     <p:spTree>
@@ -4935,605 +5141,6 @@
           <a:xfrm>
             <a:off x="1476375" y="333375"/>
             <a:ext cx="4838700" cy="5057775"/>
-          </a:xfrm>
-          <a:prstGeom prst="rect">
-            <a:avLst/>
-          </a:prstGeom>
-          <a:noFill/>
-          <a:ln w="9525">
-            <a:noFill/>
-            <a:miter lim="800000"/>
-            <a:headEnd/>
-            <a:tailEnd/>
-          </a:ln>
-          <a:effectLst/>
-        </p:spPr>
-      </p:pic>
-    </p:spTree>
-  </p:cSld>
-  <p:clrMapOvr>
-    <a:masterClrMapping/>
-  </p:clrMapOvr>
-</p:sld>
-</file>
-
-<file path=ppt/slides/slide26.xml><?xml version="1.0" encoding="utf-8"?>
-<p:sld xmlns:a="http://schemas.openxmlformats.org/drawingml/2006/main" xmlns:r="http://schemas.openxmlformats.org/officeDocument/2006/relationships" xmlns:p="http://schemas.openxmlformats.org/presentationml/2006/main">
-  <p:cSld>
-    <p:spTree>
-      <p:nvGrpSpPr>
-        <p:cNvPr id="1" name=""/>
-        <p:cNvGrpSpPr/>
-        <p:nvPr/>
-      </p:nvGrpSpPr>
-      <p:grpSpPr>
-        <a:xfrm>
-          <a:off x="0" y="0"/>
-          <a:ext cx="0" cy="0"/>
-          <a:chOff x="0" y="0"/>
-          <a:chExt cx="0" cy="0"/>
-        </a:xfrm>
-      </p:grpSpPr>
-      <p:pic>
-        <p:nvPicPr>
-          <p:cNvPr id="13316" name="Picture 4"/>
-          <p:cNvPicPr>
-            <a:picLocks noChangeAspect="1" noChangeArrowheads="1"/>
-          </p:cNvPicPr>
-          <p:nvPr/>
-        </p:nvPicPr>
-        <p:blipFill>
-          <a:blip r:embed="rId2"/>
-          <a:srcRect/>
-          <a:stretch>
-            <a:fillRect/>
-          </a:stretch>
-        </p:blipFill>
-        <p:spPr bwMode="auto">
-          <a:xfrm>
-            <a:off x="1042988" y="333375"/>
-            <a:ext cx="4838700" cy="5057775"/>
-          </a:xfrm>
-          <a:prstGeom prst="rect">
-            <a:avLst/>
-          </a:prstGeom>
-          <a:noFill/>
-          <a:ln w="9525">
-            <a:noFill/>
-            <a:miter lim="800000"/>
-            <a:headEnd/>
-            <a:tailEnd/>
-          </a:ln>
-          <a:effectLst/>
-        </p:spPr>
-      </p:pic>
-      <p:pic>
-        <p:nvPicPr>
-          <p:cNvPr id="13314" name="Picture 2"/>
-          <p:cNvPicPr>
-            <a:picLocks noChangeAspect="1" noChangeArrowheads="1"/>
-          </p:cNvPicPr>
-          <p:nvPr/>
-        </p:nvPicPr>
-        <p:blipFill>
-          <a:blip r:embed="rId3"/>
-          <a:srcRect/>
-          <a:stretch>
-            <a:fillRect/>
-          </a:stretch>
-        </p:blipFill>
-        <p:spPr bwMode="auto">
-          <a:xfrm>
-            <a:off x="4859338" y="1125538"/>
-            <a:ext cx="1981200" cy="1276350"/>
-          </a:xfrm>
-          <a:prstGeom prst="rect">
-            <a:avLst/>
-          </a:prstGeom>
-          <a:noFill/>
-          <a:ln w="9525">
-            <a:noFill/>
-            <a:miter lim="800000"/>
-            <a:headEnd/>
-            <a:tailEnd/>
-          </a:ln>
-          <a:effectLst/>
-        </p:spPr>
-      </p:pic>
-      <p:sp>
-        <p:nvSpPr>
-          <p:cNvPr id="13318" name="Line 6"/>
-          <p:cNvSpPr>
-            <a:spLocks noChangeShapeType="1"/>
-          </p:cNvSpPr>
-          <p:nvPr/>
-        </p:nvSpPr>
-        <p:spPr bwMode="auto">
-          <a:xfrm>
-            <a:off x="5651500" y="1844675"/>
-            <a:ext cx="1873250" cy="0"/>
-          </a:xfrm>
-          <a:prstGeom prst="line">
-            <a:avLst/>
-          </a:prstGeom>
-          <a:noFill/>
-          <a:ln w="12700">
-            <a:solidFill>
-              <a:schemeClr val="tx1"/>
-            </a:solidFill>
-            <a:round/>
-            <a:headEnd/>
-            <a:tailEnd type="triangle" w="med" len="med"/>
-          </a:ln>
-          <a:effectLst/>
-        </p:spPr>
-        <p:txBody>
-          <a:bodyPr/>
-          <a:lstStyle/>
-          <a:p>
-            <a:endParaRPr lang="th-TH"/>
-          </a:p>
-        </p:txBody>
-      </p:sp>
-      <p:sp>
-        <p:nvSpPr>
-          <p:cNvPr id="13319" name="Text Box 7"/>
-          <p:cNvSpPr txBox="1">
-            <a:spLocks noChangeArrowheads="1"/>
-          </p:cNvSpPr>
-          <p:nvPr/>
-        </p:nvSpPr>
-        <p:spPr bwMode="auto">
-          <a:xfrm>
-            <a:off x="7596188" y="1557338"/>
-            <a:ext cx="1296987" cy="946150"/>
-          </a:xfrm>
-          <a:prstGeom prst="rect">
-            <a:avLst/>
-          </a:prstGeom>
-          <a:noFill/>
-          <a:ln w="9525">
-            <a:noFill/>
-            <a:miter lim="800000"/>
-            <a:headEnd/>
-            <a:tailEnd/>
-          </a:ln>
-          <a:effectLst/>
-        </p:spPr>
-        <p:txBody>
-          <a:bodyPr>
-            <a:spAutoFit/>
-          </a:bodyPr>
-          <a:lstStyle/>
-          <a:p>
-            <a:pPr>
-              <a:spcBef>
-                <a:spcPct val="50000"/>
-              </a:spcBef>
-            </a:pPr>
-            <a:r>
-              <a:rPr lang="th-TH"/>
-              <a:t>ระบุจุดเริ่มต้น</a:t>
-            </a:r>
-          </a:p>
-        </p:txBody>
-      </p:sp>
-      <p:pic>
-        <p:nvPicPr>
-          <p:cNvPr id="13320" name="Picture 8"/>
-          <p:cNvPicPr>
-            <a:picLocks noChangeAspect="1" noChangeArrowheads="1"/>
-          </p:cNvPicPr>
-          <p:nvPr/>
-        </p:nvPicPr>
-        <p:blipFill>
-          <a:blip r:embed="rId4"/>
-          <a:srcRect/>
-          <a:stretch>
-            <a:fillRect/>
-          </a:stretch>
-        </p:blipFill>
-        <p:spPr bwMode="auto">
-          <a:xfrm>
-            <a:off x="4859338" y="2924175"/>
-            <a:ext cx="1981200" cy="1276350"/>
-          </a:xfrm>
-          <a:prstGeom prst="rect">
-            <a:avLst/>
-          </a:prstGeom>
-          <a:noFill/>
-          <a:ln w="9525">
-            <a:noFill/>
-            <a:miter lim="800000"/>
-            <a:headEnd/>
-            <a:tailEnd/>
-          </a:ln>
-          <a:effectLst/>
-        </p:spPr>
-      </p:pic>
-      <p:sp>
-        <p:nvSpPr>
-          <p:cNvPr id="13321" name="Line 9"/>
-          <p:cNvSpPr>
-            <a:spLocks noChangeShapeType="1"/>
-          </p:cNvSpPr>
-          <p:nvPr/>
-        </p:nvSpPr>
-        <p:spPr bwMode="auto">
-          <a:xfrm>
-            <a:off x="5651500" y="3644900"/>
-            <a:ext cx="1873250" cy="0"/>
-          </a:xfrm>
-          <a:prstGeom prst="line">
-            <a:avLst/>
-          </a:prstGeom>
-          <a:noFill/>
-          <a:ln w="12700">
-            <a:solidFill>
-              <a:schemeClr val="tx1"/>
-            </a:solidFill>
-            <a:round/>
-            <a:headEnd/>
-            <a:tailEnd type="triangle" w="med" len="med"/>
-          </a:ln>
-          <a:effectLst/>
-        </p:spPr>
-        <p:txBody>
-          <a:bodyPr/>
-          <a:lstStyle/>
-          <a:p>
-            <a:endParaRPr lang="th-TH"/>
-          </a:p>
-        </p:txBody>
-      </p:sp>
-      <p:sp>
-        <p:nvSpPr>
-          <p:cNvPr id="13322" name="Text Box 10"/>
-          <p:cNvSpPr txBox="1">
-            <a:spLocks noChangeArrowheads="1"/>
-          </p:cNvSpPr>
-          <p:nvPr/>
-        </p:nvSpPr>
-        <p:spPr bwMode="auto">
-          <a:xfrm>
-            <a:off x="7524750" y="3357563"/>
-            <a:ext cx="1150938" cy="946150"/>
-          </a:xfrm>
-          <a:prstGeom prst="rect">
-            <a:avLst/>
-          </a:prstGeom>
-          <a:noFill/>
-          <a:ln w="9525">
-            <a:noFill/>
-            <a:miter lim="800000"/>
-            <a:headEnd/>
-            <a:tailEnd/>
-          </a:ln>
-          <a:effectLst/>
-        </p:spPr>
-        <p:txBody>
-          <a:bodyPr>
-            <a:spAutoFit/>
-          </a:bodyPr>
-          <a:lstStyle/>
-          <a:p>
-            <a:pPr>
-              <a:spcBef>
-                <a:spcPct val="50000"/>
-              </a:spcBef>
-            </a:pPr>
-            <a:r>
-              <a:rPr lang="th-TH"/>
-              <a:t>ระบุปลายทาง</a:t>
-            </a:r>
-          </a:p>
-        </p:txBody>
-      </p:sp>
-    </p:spTree>
-  </p:cSld>
-  <p:clrMapOvr>
-    <a:masterClrMapping/>
-  </p:clrMapOvr>
-</p:sld>
-</file>
-
-<file path=ppt/slides/slide27.xml><?xml version="1.0" encoding="utf-8"?>
-<p:sld xmlns:a="http://schemas.openxmlformats.org/drawingml/2006/main" xmlns:r="http://schemas.openxmlformats.org/officeDocument/2006/relationships" xmlns:p="http://schemas.openxmlformats.org/presentationml/2006/main">
-  <p:cSld>
-    <p:spTree>
-      <p:nvGrpSpPr>
-        <p:cNvPr id="1" name=""/>
-        <p:cNvGrpSpPr/>
-        <p:nvPr/>
-      </p:nvGrpSpPr>
-      <p:grpSpPr>
-        <a:xfrm>
-          <a:off x="0" y="0"/>
-          <a:ext cx="0" cy="0"/>
-          <a:chOff x="0" y="0"/>
-          <a:chExt cx="0" cy="0"/>
-        </a:xfrm>
-      </p:grpSpPr>
-      <p:pic>
-        <p:nvPicPr>
-          <p:cNvPr id="21506" name="Picture 2"/>
-          <p:cNvPicPr>
-            <a:picLocks noChangeAspect="1" noChangeArrowheads="1"/>
-          </p:cNvPicPr>
-          <p:nvPr/>
-        </p:nvPicPr>
-        <p:blipFill>
-          <a:blip r:embed="rId2"/>
-          <a:srcRect/>
-          <a:stretch>
-            <a:fillRect/>
-          </a:stretch>
-        </p:blipFill>
-        <p:spPr bwMode="auto">
-          <a:xfrm>
-            <a:off x="2051050" y="476250"/>
-            <a:ext cx="4838700" cy="5057775"/>
-          </a:xfrm>
-          <a:prstGeom prst="rect">
-            <a:avLst/>
-          </a:prstGeom>
-          <a:noFill/>
-          <a:ln w="9525">
-            <a:noFill/>
-            <a:miter lim="800000"/>
-            <a:headEnd/>
-            <a:tailEnd/>
-          </a:ln>
-          <a:effectLst/>
-        </p:spPr>
-      </p:pic>
-      <p:sp>
-        <p:nvSpPr>
-          <p:cNvPr id="21511" name="Text Box 7"/>
-          <p:cNvSpPr txBox="1">
-            <a:spLocks noChangeArrowheads="1"/>
-          </p:cNvSpPr>
-          <p:nvPr/>
-        </p:nvSpPr>
-        <p:spPr bwMode="auto">
-          <a:xfrm>
-            <a:off x="1116013" y="5805488"/>
-            <a:ext cx="6335712" cy="519112"/>
-          </a:xfrm>
-          <a:prstGeom prst="rect">
-            <a:avLst/>
-          </a:prstGeom>
-          <a:noFill/>
-          <a:ln w="9525">
-            <a:noFill/>
-            <a:miter lim="800000"/>
-            <a:headEnd/>
-            <a:tailEnd/>
-          </a:ln>
-          <a:effectLst/>
-        </p:spPr>
-        <p:txBody>
-          <a:bodyPr>
-            <a:spAutoFit/>
-          </a:bodyPr>
-          <a:lstStyle/>
-          <a:p>
-            <a:pPr>
-              <a:spcBef>
-                <a:spcPct val="50000"/>
-              </a:spcBef>
-            </a:pPr>
-            <a:r>
-              <a:rPr lang="th-TH"/>
-              <a:t>ผลลัพท์จากการเพิ่ม </a:t>
-            </a:r>
-            <a:r>
-              <a:rPr lang="en-US"/>
-              <a:t>node </a:t>
-            </a:r>
-            <a:r>
-              <a:rPr lang="th-TH"/>
-              <a:t>และ </a:t>
-            </a:r>
-            <a:r>
-              <a:rPr lang="en-US"/>
-              <a:t>Edge</a:t>
-            </a:r>
-            <a:endParaRPr lang="th-TH"/>
-          </a:p>
-        </p:txBody>
-      </p:sp>
-    </p:spTree>
-  </p:cSld>
-  <p:clrMapOvr>
-    <a:masterClrMapping/>
-  </p:clrMapOvr>
-</p:sld>
-</file>
-
-<file path=ppt/slides/slide28.xml><?xml version="1.0" encoding="utf-8"?>
-<p:sld xmlns:a="http://schemas.openxmlformats.org/drawingml/2006/main" xmlns:r="http://schemas.openxmlformats.org/officeDocument/2006/relationships" xmlns:p="http://schemas.openxmlformats.org/presentationml/2006/main">
-  <p:cSld>
-    <p:spTree>
-      <p:nvGrpSpPr>
-        <p:cNvPr id="1" name=""/>
-        <p:cNvGrpSpPr/>
-        <p:nvPr/>
-      </p:nvGrpSpPr>
-      <p:grpSpPr>
-        <a:xfrm>
-          <a:off x="0" y="0"/>
-          <a:ext cx="0" cy="0"/>
-          <a:chOff x="0" y="0"/>
-          <a:chExt cx="0" cy="0"/>
-        </a:xfrm>
-      </p:grpSpPr>
-      <p:sp>
-        <p:nvSpPr>
-          <p:cNvPr id="20482" name="Text Box 2"/>
-          <p:cNvSpPr txBox="1">
-            <a:spLocks noChangeArrowheads="1"/>
-          </p:cNvSpPr>
-          <p:nvPr/>
-        </p:nvSpPr>
-        <p:spPr bwMode="auto">
-          <a:xfrm>
-            <a:off x="1403350" y="404813"/>
-            <a:ext cx="5256213" cy="519112"/>
-          </a:xfrm>
-          <a:prstGeom prst="rect">
-            <a:avLst/>
-          </a:prstGeom>
-          <a:noFill/>
-          <a:ln w="9525">
-            <a:noFill/>
-            <a:miter lim="800000"/>
-            <a:headEnd/>
-            <a:tailEnd/>
-          </a:ln>
-          <a:effectLst/>
-        </p:spPr>
-        <p:txBody>
-          <a:bodyPr>
-            <a:spAutoFit/>
-          </a:bodyPr>
-          <a:lstStyle/>
-          <a:p>
-            <a:pPr>
-              <a:spcBef>
-                <a:spcPct val="50000"/>
-              </a:spcBef>
-            </a:pPr>
-            <a:r>
-              <a:rPr lang="th-TH"/>
-              <a:t>วิธีการลบ </a:t>
-            </a:r>
-            <a:r>
-              <a:rPr lang="en-US"/>
-              <a:t>Node </a:t>
-            </a:r>
-            <a:r>
-              <a:rPr lang="th-TH"/>
-              <a:t>และ </a:t>
-            </a:r>
-            <a:r>
-              <a:rPr lang="en-US"/>
-              <a:t>Edge</a:t>
-            </a:r>
-            <a:endParaRPr lang="th-TH"/>
-          </a:p>
-        </p:txBody>
-      </p:sp>
-      <p:pic>
-        <p:nvPicPr>
-          <p:cNvPr id="20483" name="Picture 3"/>
-          <p:cNvPicPr>
-            <a:picLocks noChangeAspect="1" noChangeArrowheads="1"/>
-          </p:cNvPicPr>
-          <p:nvPr/>
-        </p:nvPicPr>
-        <p:blipFill>
-          <a:blip r:embed="rId2"/>
-          <a:srcRect/>
-          <a:stretch>
-            <a:fillRect/>
-          </a:stretch>
-        </p:blipFill>
-        <p:spPr bwMode="auto">
-          <a:xfrm>
-            <a:off x="2555875" y="1052513"/>
-            <a:ext cx="4838700" cy="5057775"/>
-          </a:xfrm>
-          <a:prstGeom prst="rect">
-            <a:avLst/>
-          </a:prstGeom>
-          <a:noFill/>
-          <a:ln w="9525">
-            <a:noFill/>
-            <a:miter lim="800000"/>
-            <a:headEnd/>
-            <a:tailEnd/>
-          </a:ln>
-          <a:effectLst/>
-        </p:spPr>
-      </p:pic>
-    </p:spTree>
-  </p:cSld>
-  <p:clrMapOvr>
-    <a:masterClrMapping/>
-  </p:clrMapOvr>
-</p:sld>
-</file>
-
-<file path=ppt/slides/slide29.xml><?xml version="1.0" encoding="utf-8"?>
-<p:sld xmlns:a="http://schemas.openxmlformats.org/drawingml/2006/main" xmlns:r="http://schemas.openxmlformats.org/officeDocument/2006/relationships" xmlns:p="http://schemas.openxmlformats.org/presentationml/2006/main">
-  <p:cSld>
-    <p:spTree>
-      <p:nvGrpSpPr>
-        <p:cNvPr id="1" name=""/>
-        <p:cNvGrpSpPr/>
-        <p:nvPr/>
-      </p:nvGrpSpPr>
-      <p:grpSpPr>
-        <a:xfrm>
-          <a:off x="0" y="0"/>
-          <a:ext cx="0" cy="0"/>
-          <a:chOff x="0" y="0"/>
-          <a:chExt cx="0" cy="0"/>
-        </a:xfrm>
-      </p:grpSpPr>
-      <p:pic>
-        <p:nvPicPr>
-          <p:cNvPr id="19460" name="Picture 4"/>
-          <p:cNvPicPr>
-            <a:picLocks noChangeAspect="1" noChangeArrowheads="1"/>
-          </p:cNvPicPr>
-          <p:nvPr/>
-        </p:nvPicPr>
-        <p:blipFill>
-          <a:blip r:embed="rId2"/>
-          <a:srcRect/>
-          <a:stretch>
-            <a:fillRect/>
-          </a:stretch>
-        </p:blipFill>
-        <p:spPr bwMode="auto">
-          <a:xfrm>
-            <a:off x="1042988" y="549275"/>
-            <a:ext cx="4838700" cy="5057775"/>
-          </a:xfrm>
-          <a:prstGeom prst="rect">
-            <a:avLst/>
-          </a:prstGeom>
-          <a:noFill/>
-          <a:ln w="9525">
-            <a:noFill/>
-            <a:miter lim="800000"/>
-            <a:headEnd/>
-            <a:tailEnd/>
-          </a:ln>
-          <a:effectLst/>
-        </p:spPr>
-      </p:pic>
-      <p:pic>
-        <p:nvPicPr>
-          <p:cNvPr id="19458" name="Picture 2"/>
-          <p:cNvPicPr>
-            <a:picLocks noChangeAspect="1" noChangeArrowheads="1"/>
-          </p:cNvPicPr>
-          <p:nvPr/>
-        </p:nvPicPr>
-        <p:blipFill>
-          <a:blip r:embed="rId3"/>
-          <a:srcRect/>
-          <a:stretch>
-            <a:fillRect/>
-          </a:stretch>
-        </p:blipFill>
-        <p:spPr bwMode="auto">
-          <a:xfrm>
-            <a:off x="4859338" y="1268413"/>
-            <a:ext cx="1981200" cy="1276350"/>
           </a:xfrm>
           <a:prstGeom prst="rect">
             <a:avLst/>
@@ -5633,7 +5240,7 @@
       </p:grpSpPr>
       <p:pic>
         <p:nvPicPr>
-          <p:cNvPr id="18434" name="Picture 2"/>
+          <p:cNvPr id="13316" name="Picture 4"/>
           <p:cNvPicPr>
             <a:picLocks noChangeAspect="1" noChangeArrowheads="1"/>
           </p:cNvPicPr>
@@ -5648,7 +5255,7 @@
         </p:blipFill>
         <p:spPr bwMode="auto">
           <a:xfrm>
-            <a:off x="2124075" y="404813"/>
+            <a:off x="1042988" y="333375"/>
             <a:ext cx="4838700" cy="5057775"/>
           </a:xfrm>
           <a:prstGeom prst="rect">
@@ -5664,9 +5271,77 @@
           <a:effectLst/>
         </p:spPr>
       </p:pic>
-      <p:sp>
-        <p:nvSpPr>
-          <p:cNvPr id="18435" name="Text Box 3"/>
+      <p:pic>
+        <p:nvPicPr>
+          <p:cNvPr id="13314" name="Picture 2"/>
+          <p:cNvPicPr>
+            <a:picLocks noChangeAspect="1" noChangeArrowheads="1"/>
+          </p:cNvPicPr>
+          <p:nvPr/>
+        </p:nvPicPr>
+        <p:blipFill>
+          <a:blip r:embed="rId3"/>
+          <a:srcRect/>
+          <a:stretch>
+            <a:fillRect/>
+          </a:stretch>
+        </p:blipFill>
+        <p:spPr bwMode="auto">
+          <a:xfrm>
+            <a:off x="4859338" y="1125538"/>
+            <a:ext cx="1981200" cy="1276350"/>
+          </a:xfrm>
+          <a:prstGeom prst="rect">
+            <a:avLst/>
+          </a:prstGeom>
+          <a:noFill/>
+          <a:ln w="9525">
+            <a:noFill/>
+            <a:miter lim="800000"/>
+            <a:headEnd/>
+            <a:tailEnd/>
+          </a:ln>
+          <a:effectLst/>
+        </p:spPr>
+      </p:pic>
+      <p:sp>
+        <p:nvSpPr>
+          <p:cNvPr id="13318" name="Line 6"/>
+          <p:cNvSpPr>
+            <a:spLocks noChangeShapeType="1"/>
+          </p:cNvSpPr>
+          <p:nvPr/>
+        </p:nvSpPr>
+        <p:spPr bwMode="auto">
+          <a:xfrm>
+            <a:off x="5651500" y="1844675"/>
+            <a:ext cx="1873250" cy="0"/>
+          </a:xfrm>
+          <a:prstGeom prst="line">
+            <a:avLst/>
+          </a:prstGeom>
+          <a:noFill/>
+          <a:ln w="12700">
+            <a:solidFill>
+              <a:schemeClr val="tx1"/>
+            </a:solidFill>
+            <a:round/>
+            <a:headEnd/>
+            <a:tailEnd type="triangle" w="med" len="med"/>
+          </a:ln>
+          <a:effectLst/>
+        </p:spPr>
+        <p:txBody>
+          <a:bodyPr/>
+          <a:lstStyle/>
+          <a:p>
+            <a:endParaRPr lang="th-TH"/>
+          </a:p>
+        </p:txBody>
+      </p:sp>
+      <p:sp>
+        <p:nvSpPr>
+          <p:cNvPr id="13319" name="Text Box 7"/>
           <p:cNvSpPr txBox="1">
             <a:spLocks noChangeArrowheads="1"/>
           </p:cNvSpPr>
@@ -5674,8 +5349,8 @@
         </p:nvSpPr>
         <p:spPr bwMode="auto">
           <a:xfrm>
-            <a:off x="684213" y="5805488"/>
-            <a:ext cx="5616575" cy="519112"/>
+            <a:off x="7596188" y="1557338"/>
+            <a:ext cx="1296987" cy="946150"/>
           </a:xfrm>
           <a:prstGeom prst="rect">
             <a:avLst/>
@@ -5702,21 +5377,119 @@
             </a:pPr>
             <a:r>
               <a:rPr lang="th-TH"/>
-              <a:t>ผลลัพท์ที่ได้จากการลบ </a:t>
-            </a:r>
-            <a:r>
-              <a:rPr lang="en-US"/>
-              <a:t>Node </a:t>
-            </a:r>
+              <a:t>ระบุจุดเริ่มต้น</a:t>
+            </a:r>
+          </a:p>
+        </p:txBody>
+      </p:sp>
+      <p:pic>
+        <p:nvPicPr>
+          <p:cNvPr id="13320" name="Picture 8"/>
+          <p:cNvPicPr>
+            <a:picLocks noChangeAspect="1" noChangeArrowheads="1"/>
+          </p:cNvPicPr>
+          <p:nvPr/>
+        </p:nvPicPr>
+        <p:blipFill>
+          <a:blip r:embed="rId4"/>
+          <a:srcRect/>
+          <a:stretch>
+            <a:fillRect/>
+          </a:stretch>
+        </p:blipFill>
+        <p:spPr bwMode="auto">
+          <a:xfrm>
+            <a:off x="4859338" y="2924175"/>
+            <a:ext cx="1981200" cy="1276350"/>
+          </a:xfrm>
+          <a:prstGeom prst="rect">
+            <a:avLst/>
+          </a:prstGeom>
+          <a:noFill/>
+          <a:ln w="9525">
+            <a:noFill/>
+            <a:miter lim="800000"/>
+            <a:headEnd/>
+            <a:tailEnd/>
+          </a:ln>
+          <a:effectLst/>
+        </p:spPr>
+      </p:pic>
+      <p:sp>
+        <p:nvSpPr>
+          <p:cNvPr id="13321" name="Line 9"/>
+          <p:cNvSpPr>
+            <a:spLocks noChangeShapeType="1"/>
+          </p:cNvSpPr>
+          <p:nvPr/>
+        </p:nvSpPr>
+        <p:spPr bwMode="auto">
+          <a:xfrm>
+            <a:off x="5651500" y="3644900"/>
+            <a:ext cx="1873250" cy="0"/>
+          </a:xfrm>
+          <a:prstGeom prst="line">
+            <a:avLst/>
+          </a:prstGeom>
+          <a:noFill/>
+          <a:ln w="12700">
+            <a:solidFill>
+              <a:schemeClr val="tx1"/>
+            </a:solidFill>
+            <a:round/>
+            <a:headEnd/>
+            <a:tailEnd type="triangle" w="med" len="med"/>
+          </a:ln>
+          <a:effectLst/>
+        </p:spPr>
+        <p:txBody>
+          <a:bodyPr/>
+          <a:lstStyle/>
+          <a:p>
+            <a:endParaRPr lang="th-TH"/>
+          </a:p>
+        </p:txBody>
+      </p:sp>
+      <p:sp>
+        <p:nvSpPr>
+          <p:cNvPr id="13322" name="Text Box 10"/>
+          <p:cNvSpPr txBox="1">
+            <a:spLocks noChangeArrowheads="1"/>
+          </p:cNvSpPr>
+          <p:nvPr/>
+        </p:nvSpPr>
+        <p:spPr bwMode="auto">
+          <a:xfrm>
+            <a:off x="7524750" y="3357563"/>
+            <a:ext cx="1150938" cy="946150"/>
+          </a:xfrm>
+          <a:prstGeom prst="rect">
+            <a:avLst/>
+          </a:prstGeom>
+          <a:noFill/>
+          <a:ln w="9525">
+            <a:noFill/>
+            <a:miter lim="800000"/>
+            <a:headEnd/>
+            <a:tailEnd/>
+          </a:ln>
+          <a:effectLst/>
+        </p:spPr>
+        <p:txBody>
+          <a:bodyPr>
+            <a:spAutoFit/>
+          </a:bodyPr>
+          <a:lstStyle/>
+          <a:p>
+            <a:pPr>
+              <a:spcBef>
+                <a:spcPct val="50000"/>
+              </a:spcBef>
+            </a:pPr>
             <a:r>
               <a:rPr lang="th-TH"/>
-              <a:t>และ </a:t>
-            </a:r>
-            <a:r>
-              <a:rPr lang="en-US"/>
-              <a:t>Edge</a:t>
-            </a:r>
-            <a:endParaRPr lang="th-TH"/>
+              <a:t>ระบุปลายทาง</a:t>
+            </a:r>
           </a:p>
         </p:txBody>
       </p:sp>
@@ -5745,6 +5518,439 @@
           <a:chExt cx="0" cy="0"/>
         </a:xfrm>
       </p:grpSpPr>
+      <p:pic>
+        <p:nvPicPr>
+          <p:cNvPr id="21506" name="Picture 2"/>
+          <p:cNvPicPr>
+            <a:picLocks noChangeAspect="1" noChangeArrowheads="1"/>
+          </p:cNvPicPr>
+          <p:nvPr/>
+        </p:nvPicPr>
+        <p:blipFill>
+          <a:blip r:embed="rId2"/>
+          <a:srcRect/>
+          <a:stretch>
+            <a:fillRect/>
+          </a:stretch>
+        </p:blipFill>
+        <p:spPr bwMode="auto">
+          <a:xfrm>
+            <a:off x="2051050" y="476250"/>
+            <a:ext cx="4838700" cy="5057775"/>
+          </a:xfrm>
+          <a:prstGeom prst="rect">
+            <a:avLst/>
+          </a:prstGeom>
+          <a:noFill/>
+          <a:ln w="9525">
+            <a:noFill/>
+            <a:miter lim="800000"/>
+            <a:headEnd/>
+            <a:tailEnd/>
+          </a:ln>
+          <a:effectLst/>
+        </p:spPr>
+      </p:pic>
+      <p:sp>
+        <p:nvSpPr>
+          <p:cNvPr id="21511" name="Text Box 7"/>
+          <p:cNvSpPr txBox="1">
+            <a:spLocks noChangeArrowheads="1"/>
+          </p:cNvSpPr>
+          <p:nvPr/>
+        </p:nvSpPr>
+        <p:spPr bwMode="auto">
+          <a:xfrm>
+            <a:off x="1116013" y="5805488"/>
+            <a:ext cx="6335712" cy="519112"/>
+          </a:xfrm>
+          <a:prstGeom prst="rect">
+            <a:avLst/>
+          </a:prstGeom>
+          <a:noFill/>
+          <a:ln w="9525">
+            <a:noFill/>
+            <a:miter lim="800000"/>
+            <a:headEnd/>
+            <a:tailEnd/>
+          </a:ln>
+          <a:effectLst/>
+        </p:spPr>
+        <p:txBody>
+          <a:bodyPr>
+            <a:spAutoFit/>
+          </a:bodyPr>
+          <a:lstStyle/>
+          <a:p>
+            <a:pPr>
+              <a:spcBef>
+                <a:spcPct val="50000"/>
+              </a:spcBef>
+            </a:pPr>
+            <a:r>
+              <a:rPr lang="th-TH"/>
+              <a:t>ผลลัพท์จากการเพิ่ม </a:t>
+            </a:r>
+            <a:r>
+              <a:rPr lang="en-US"/>
+              <a:t>node </a:t>
+            </a:r>
+            <a:r>
+              <a:rPr lang="th-TH"/>
+              <a:t>และ </a:t>
+            </a:r>
+            <a:r>
+              <a:rPr lang="en-US"/>
+              <a:t>Edge</a:t>
+            </a:r>
+            <a:endParaRPr lang="th-TH"/>
+          </a:p>
+        </p:txBody>
+      </p:sp>
+    </p:spTree>
+  </p:cSld>
+  <p:clrMapOvr>
+    <a:masterClrMapping/>
+  </p:clrMapOvr>
+</p:sld>
+</file>
+
+<file path=ppt/slides/slide32.xml><?xml version="1.0" encoding="utf-8"?>
+<p:sld xmlns:a="http://schemas.openxmlformats.org/drawingml/2006/main" xmlns:r="http://schemas.openxmlformats.org/officeDocument/2006/relationships" xmlns:p="http://schemas.openxmlformats.org/presentationml/2006/main">
+  <p:cSld>
+    <p:spTree>
+      <p:nvGrpSpPr>
+        <p:cNvPr id="1" name=""/>
+        <p:cNvGrpSpPr/>
+        <p:nvPr/>
+      </p:nvGrpSpPr>
+      <p:grpSpPr>
+        <a:xfrm>
+          <a:off x="0" y="0"/>
+          <a:ext cx="0" cy="0"/>
+          <a:chOff x="0" y="0"/>
+          <a:chExt cx="0" cy="0"/>
+        </a:xfrm>
+      </p:grpSpPr>
+      <p:sp>
+        <p:nvSpPr>
+          <p:cNvPr id="20482" name="Text Box 2"/>
+          <p:cNvSpPr txBox="1">
+            <a:spLocks noChangeArrowheads="1"/>
+          </p:cNvSpPr>
+          <p:nvPr/>
+        </p:nvSpPr>
+        <p:spPr bwMode="auto">
+          <a:xfrm>
+            <a:off x="1403350" y="404813"/>
+            <a:ext cx="5256213" cy="519112"/>
+          </a:xfrm>
+          <a:prstGeom prst="rect">
+            <a:avLst/>
+          </a:prstGeom>
+          <a:noFill/>
+          <a:ln w="9525">
+            <a:noFill/>
+            <a:miter lim="800000"/>
+            <a:headEnd/>
+            <a:tailEnd/>
+          </a:ln>
+          <a:effectLst/>
+        </p:spPr>
+        <p:txBody>
+          <a:bodyPr>
+            <a:spAutoFit/>
+          </a:bodyPr>
+          <a:lstStyle/>
+          <a:p>
+            <a:pPr>
+              <a:spcBef>
+                <a:spcPct val="50000"/>
+              </a:spcBef>
+            </a:pPr>
+            <a:r>
+              <a:rPr lang="th-TH"/>
+              <a:t>วิธีการลบ </a:t>
+            </a:r>
+            <a:r>
+              <a:rPr lang="en-US"/>
+              <a:t>Node </a:t>
+            </a:r>
+            <a:r>
+              <a:rPr lang="th-TH"/>
+              <a:t>และ </a:t>
+            </a:r>
+            <a:r>
+              <a:rPr lang="en-US"/>
+              <a:t>Edge</a:t>
+            </a:r>
+            <a:endParaRPr lang="th-TH"/>
+          </a:p>
+        </p:txBody>
+      </p:sp>
+      <p:pic>
+        <p:nvPicPr>
+          <p:cNvPr id="20483" name="Picture 3"/>
+          <p:cNvPicPr>
+            <a:picLocks noChangeAspect="1" noChangeArrowheads="1"/>
+          </p:cNvPicPr>
+          <p:nvPr/>
+        </p:nvPicPr>
+        <p:blipFill>
+          <a:blip r:embed="rId2"/>
+          <a:srcRect/>
+          <a:stretch>
+            <a:fillRect/>
+          </a:stretch>
+        </p:blipFill>
+        <p:spPr bwMode="auto">
+          <a:xfrm>
+            <a:off x="2555875" y="1052513"/>
+            <a:ext cx="4838700" cy="5057775"/>
+          </a:xfrm>
+          <a:prstGeom prst="rect">
+            <a:avLst/>
+          </a:prstGeom>
+          <a:noFill/>
+          <a:ln w="9525">
+            <a:noFill/>
+            <a:miter lim="800000"/>
+            <a:headEnd/>
+            <a:tailEnd/>
+          </a:ln>
+          <a:effectLst/>
+        </p:spPr>
+      </p:pic>
+    </p:spTree>
+  </p:cSld>
+  <p:clrMapOvr>
+    <a:masterClrMapping/>
+  </p:clrMapOvr>
+</p:sld>
+</file>
+
+<file path=ppt/slides/slide33.xml><?xml version="1.0" encoding="utf-8"?>
+<p:sld xmlns:a="http://schemas.openxmlformats.org/drawingml/2006/main" xmlns:r="http://schemas.openxmlformats.org/officeDocument/2006/relationships" xmlns:p="http://schemas.openxmlformats.org/presentationml/2006/main">
+  <p:cSld>
+    <p:spTree>
+      <p:nvGrpSpPr>
+        <p:cNvPr id="1" name=""/>
+        <p:cNvGrpSpPr/>
+        <p:nvPr/>
+      </p:nvGrpSpPr>
+      <p:grpSpPr>
+        <a:xfrm>
+          <a:off x="0" y="0"/>
+          <a:ext cx="0" cy="0"/>
+          <a:chOff x="0" y="0"/>
+          <a:chExt cx="0" cy="0"/>
+        </a:xfrm>
+      </p:grpSpPr>
+      <p:pic>
+        <p:nvPicPr>
+          <p:cNvPr id="19460" name="Picture 4"/>
+          <p:cNvPicPr>
+            <a:picLocks noChangeAspect="1" noChangeArrowheads="1"/>
+          </p:cNvPicPr>
+          <p:nvPr/>
+        </p:nvPicPr>
+        <p:blipFill>
+          <a:blip r:embed="rId2"/>
+          <a:srcRect/>
+          <a:stretch>
+            <a:fillRect/>
+          </a:stretch>
+        </p:blipFill>
+        <p:spPr bwMode="auto">
+          <a:xfrm>
+            <a:off x="1042988" y="549275"/>
+            <a:ext cx="4838700" cy="5057775"/>
+          </a:xfrm>
+          <a:prstGeom prst="rect">
+            <a:avLst/>
+          </a:prstGeom>
+          <a:noFill/>
+          <a:ln w="9525">
+            <a:noFill/>
+            <a:miter lim="800000"/>
+            <a:headEnd/>
+            <a:tailEnd/>
+          </a:ln>
+          <a:effectLst/>
+        </p:spPr>
+      </p:pic>
+      <p:pic>
+        <p:nvPicPr>
+          <p:cNvPr id="19458" name="Picture 2"/>
+          <p:cNvPicPr>
+            <a:picLocks noChangeAspect="1" noChangeArrowheads="1"/>
+          </p:cNvPicPr>
+          <p:nvPr/>
+        </p:nvPicPr>
+        <p:blipFill>
+          <a:blip r:embed="rId3"/>
+          <a:srcRect/>
+          <a:stretch>
+            <a:fillRect/>
+          </a:stretch>
+        </p:blipFill>
+        <p:spPr bwMode="auto">
+          <a:xfrm>
+            <a:off x="6215074" y="1214422"/>
+            <a:ext cx="1981200" cy="1276350"/>
+          </a:xfrm>
+          <a:prstGeom prst="rect">
+            <a:avLst/>
+          </a:prstGeom>
+          <a:noFill/>
+          <a:ln w="9525">
+            <a:noFill/>
+            <a:miter lim="800000"/>
+            <a:headEnd/>
+            <a:tailEnd/>
+          </a:ln>
+          <a:effectLst/>
+        </p:spPr>
+      </p:pic>
+    </p:spTree>
+  </p:cSld>
+  <p:clrMapOvr>
+    <a:masterClrMapping/>
+  </p:clrMapOvr>
+</p:sld>
+</file>
+
+<file path=ppt/slides/slide34.xml><?xml version="1.0" encoding="utf-8"?>
+<p:sld xmlns:a="http://schemas.openxmlformats.org/drawingml/2006/main" xmlns:r="http://schemas.openxmlformats.org/officeDocument/2006/relationships" xmlns:p="http://schemas.openxmlformats.org/presentationml/2006/main">
+  <p:cSld>
+    <p:spTree>
+      <p:nvGrpSpPr>
+        <p:cNvPr id="1" name=""/>
+        <p:cNvGrpSpPr/>
+        <p:nvPr/>
+      </p:nvGrpSpPr>
+      <p:grpSpPr>
+        <a:xfrm>
+          <a:off x="0" y="0"/>
+          <a:ext cx="0" cy="0"/>
+          <a:chOff x="0" y="0"/>
+          <a:chExt cx="0" cy="0"/>
+        </a:xfrm>
+      </p:grpSpPr>
+      <p:pic>
+        <p:nvPicPr>
+          <p:cNvPr id="18434" name="Picture 2"/>
+          <p:cNvPicPr>
+            <a:picLocks noChangeAspect="1" noChangeArrowheads="1"/>
+          </p:cNvPicPr>
+          <p:nvPr/>
+        </p:nvPicPr>
+        <p:blipFill>
+          <a:blip r:embed="rId2"/>
+          <a:srcRect/>
+          <a:stretch>
+            <a:fillRect/>
+          </a:stretch>
+        </p:blipFill>
+        <p:spPr bwMode="auto">
+          <a:xfrm>
+            <a:off x="2124075" y="404813"/>
+            <a:ext cx="4838700" cy="5057775"/>
+          </a:xfrm>
+          <a:prstGeom prst="rect">
+            <a:avLst/>
+          </a:prstGeom>
+          <a:noFill/>
+          <a:ln w="9525">
+            <a:noFill/>
+            <a:miter lim="800000"/>
+            <a:headEnd/>
+            <a:tailEnd/>
+          </a:ln>
+          <a:effectLst/>
+        </p:spPr>
+      </p:pic>
+      <p:sp>
+        <p:nvSpPr>
+          <p:cNvPr id="18435" name="Text Box 3"/>
+          <p:cNvSpPr txBox="1">
+            <a:spLocks noChangeArrowheads="1"/>
+          </p:cNvSpPr>
+          <p:nvPr/>
+        </p:nvSpPr>
+        <p:spPr bwMode="auto">
+          <a:xfrm>
+            <a:off x="684213" y="5805488"/>
+            <a:ext cx="5616575" cy="519112"/>
+          </a:xfrm>
+          <a:prstGeom prst="rect">
+            <a:avLst/>
+          </a:prstGeom>
+          <a:noFill/>
+          <a:ln w="9525">
+            <a:noFill/>
+            <a:miter lim="800000"/>
+            <a:headEnd/>
+            <a:tailEnd/>
+          </a:ln>
+          <a:effectLst/>
+        </p:spPr>
+        <p:txBody>
+          <a:bodyPr>
+            <a:spAutoFit/>
+          </a:bodyPr>
+          <a:lstStyle/>
+          <a:p>
+            <a:pPr>
+              <a:spcBef>
+                <a:spcPct val="50000"/>
+              </a:spcBef>
+            </a:pPr>
+            <a:r>
+              <a:rPr lang="th-TH"/>
+              <a:t>ผลลัพท์ที่ได้จากการลบ </a:t>
+            </a:r>
+            <a:r>
+              <a:rPr lang="en-US"/>
+              <a:t>Node </a:t>
+            </a:r>
+            <a:r>
+              <a:rPr lang="th-TH"/>
+              <a:t>และ </a:t>
+            </a:r>
+            <a:r>
+              <a:rPr lang="en-US"/>
+              <a:t>Edge</a:t>
+            </a:r>
+            <a:endParaRPr lang="th-TH"/>
+          </a:p>
+        </p:txBody>
+      </p:sp>
+    </p:spTree>
+  </p:cSld>
+  <p:clrMapOvr>
+    <a:masterClrMapping/>
+  </p:clrMapOvr>
+</p:sld>
+</file>
+
+<file path=ppt/slides/slide35.xml><?xml version="1.0" encoding="utf-8"?>
+<p:sld xmlns:a="http://schemas.openxmlformats.org/drawingml/2006/main" xmlns:r="http://schemas.openxmlformats.org/officeDocument/2006/relationships" xmlns:p="http://schemas.openxmlformats.org/presentationml/2006/main">
+  <p:cSld>
+    <p:spTree>
+      <p:nvGrpSpPr>
+        <p:cNvPr id="1" name=""/>
+        <p:cNvGrpSpPr/>
+        <p:nvPr/>
+      </p:nvGrpSpPr>
+      <p:grpSpPr>
+        <a:xfrm>
+          <a:off x="0" y="0"/>
+          <a:ext cx="0" cy="0"/>
+          <a:chOff x="0" y="0"/>
+          <a:chExt cx="0" cy="0"/>
+        </a:xfrm>
+      </p:grpSpPr>
       <p:sp>
         <p:nvSpPr>
           <p:cNvPr id="17410" name="Text Box 2"/>
@@ -5837,7 +6043,7 @@
 </p:sld>
 </file>
 
-<file path=ppt/slides/slide32.xml><?xml version="1.0" encoding="utf-8"?>
+<file path=ppt/slides/slide36.xml><?xml version="1.0" encoding="utf-8"?>
 <p:sld xmlns:a="http://schemas.openxmlformats.org/drawingml/2006/main" xmlns:r="http://schemas.openxmlformats.org/officeDocument/2006/relationships" xmlns:p="http://schemas.openxmlformats.org/presentationml/2006/main">
   <p:cSld>
     <p:spTree>
@@ -5938,7 +6144,7 @@
 </p:sld>
 </file>
 
-<file path=ppt/slides/slide33.xml><?xml version="1.0" encoding="utf-8"?>
+<file path=ppt/slides/slide37.xml><?xml version="1.0" encoding="utf-8"?>
 <p:sld xmlns:a="http://schemas.openxmlformats.org/drawingml/2006/main" xmlns:r="http://schemas.openxmlformats.org/officeDocument/2006/relationships" xmlns:p="http://schemas.openxmlformats.org/presentationml/2006/main">
   <p:cSld>
     <p:spTree>
@@ -5957,7 +6163,7 @@
       </p:grpSpPr>
       <p:pic>
         <p:nvPicPr>
-          <p:cNvPr id="22532" name="Picture 4"/>
+          <p:cNvPr id="3074" name="Picture 2"/>
           <p:cNvPicPr>
             <a:picLocks noChangeAspect="1" noChangeArrowheads="1"/>
           </p:cNvPicPr>
@@ -5972,8 +6178,8 @@
         </p:blipFill>
         <p:spPr bwMode="auto">
           <a:xfrm>
-            <a:off x="2484438" y="1341438"/>
-            <a:ext cx="4838700" cy="5057775"/>
+            <a:off x="2152650" y="885825"/>
+            <a:ext cx="4838700" cy="5086350"/>
           </a:xfrm>
           <a:prstGeom prst="rect">
             <a:avLst/>
@@ -5988,54 +6194,6 @@
           <a:effectLst/>
         </p:spPr>
       </p:pic>
-      <p:sp>
-        <p:nvSpPr>
-          <p:cNvPr id="22533" name="Text Box 5"/>
-          <p:cNvSpPr txBox="1">
-            <a:spLocks noChangeArrowheads="1"/>
-          </p:cNvSpPr>
-          <p:nvPr/>
-        </p:nvSpPr>
-        <p:spPr bwMode="auto">
-          <a:xfrm>
-            <a:off x="611188" y="476250"/>
-            <a:ext cx="5832475" cy="519113"/>
-          </a:xfrm>
-          <a:prstGeom prst="rect">
-            <a:avLst/>
-          </a:prstGeom>
-          <a:noFill/>
-          <a:ln w="9525">
-            <a:noFill/>
-            <a:miter lim="800000"/>
-            <a:headEnd/>
-            <a:tailEnd/>
-          </a:ln>
-          <a:effectLst/>
-        </p:spPr>
-        <p:txBody>
-          <a:bodyPr>
-            <a:spAutoFit/>
-          </a:bodyPr>
-          <a:lstStyle/>
-          <a:p>
-            <a:pPr>
-              <a:spcBef>
-                <a:spcPct val="50000"/>
-              </a:spcBef>
-            </a:pPr>
-            <a:r>
-              <a:rPr lang="th-TH"/>
-              <a:t>วิธีการหา </a:t>
-            </a:r>
-            <a:r>
-              <a:rPr lang="en-US"/>
-              <a:t>Breadth first traversal tree</a:t>
-            </a:r>
-            <a:endParaRPr lang="th-TH"/>
-          </a:p>
-        </p:txBody>
-      </p:sp>
     </p:spTree>
   </p:cSld>
   <p:clrMapOvr>
@@ -6044,7 +6202,7 @@
 </p:sld>
 </file>
 
-<file path=ppt/slides/slide34.xml><?xml version="1.0" encoding="utf-8"?>
+<file path=ppt/slides/slide38.xml><?xml version="1.0" encoding="utf-8"?>
 <p:sld xmlns:a="http://schemas.openxmlformats.org/drawingml/2006/main" xmlns:r="http://schemas.openxmlformats.org/officeDocument/2006/relationships" xmlns:p="http://schemas.openxmlformats.org/presentationml/2006/main">
   <p:cSld>
     <p:spTree>
@@ -6063,7 +6221,7 @@
       </p:grpSpPr>
       <p:pic>
         <p:nvPicPr>
-          <p:cNvPr id="15363" name="Picture 3"/>
+          <p:cNvPr id="4099" name="Picture 3"/>
           <p:cNvPicPr>
             <a:picLocks noChangeAspect="1" noChangeArrowheads="1"/>
           </p:cNvPicPr>
@@ -6078,8 +6236,8 @@
         </p:blipFill>
         <p:spPr bwMode="auto">
           <a:xfrm>
-            <a:off x="1908175" y="692150"/>
-            <a:ext cx="4838700" cy="5057775"/>
+            <a:off x="2152650" y="885825"/>
+            <a:ext cx="4838700" cy="5086350"/>
           </a:xfrm>
           <a:prstGeom prst="rect">
             <a:avLst/>
@@ -6096,7 +6254,7 @@
       </p:pic>
       <p:pic>
         <p:nvPicPr>
-          <p:cNvPr id="15362" name="Picture 2"/>
+          <p:cNvPr id="4098" name="Picture 2"/>
           <p:cNvPicPr>
             <a:picLocks noChangeAspect="1" noChangeArrowheads="1"/>
           </p:cNvPicPr>
@@ -6111,7 +6269,7 @@
         </p:blipFill>
         <p:spPr bwMode="auto">
           <a:xfrm>
-            <a:off x="5076825" y="1196975"/>
+            <a:off x="3581400" y="2790825"/>
             <a:ext cx="1981200" cy="1276350"/>
           </a:xfrm>
           <a:prstGeom prst="rect">
@@ -6135,7 +6293,7 @@
 </p:sld>
 </file>
 
-<file path=ppt/slides/slide35.xml><?xml version="1.0" encoding="utf-8"?>
+<file path=ppt/slides/slide39.xml><?xml version="1.0" encoding="utf-8"?>
 <p:sld xmlns:a="http://schemas.openxmlformats.org/drawingml/2006/main" xmlns:r="http://schemas.openxmlformats.org/officeDocument/2006/relationships" xmlns:p="http://schemas.openxmlformats.org/presentationml/2006/main">
   <p:cSld>
     <p:spTree>
@@ -6154,7 +6312,7 @@
       </p:grpSpPr>
       <p:pic>
         <p:nvPicPr>
-          <p:cNvPr id="14338" name="Picture 2"/>
+          <p:cNvPr id="5122" name="Picture 2"/>
           <p:cNvPicPr>
             <a:picLocks noChangeAspect="1" noChangeArrowheads="1"/>
           </p:cNvPicPr>
@@ -6169,8 +6327,8 @@
         </p:blipFill>
         <p:spPr bwMode="auto">
           <a:xfrm>
-            <a:off x="2152650" y="900113"/>
-            <a:ext cx="4838700" cy="5057775"/>
+            <a:off x="2152650" y="885825"/>
+            <a:ext cx="4838700" cy="5086350"/>
           </a:xfrm>
           <a:prstGeom prst="rect">
             <a:avLst/>
@@ -6185,49 +6343,6 @@
           <a:effectLst/>
         </p:spPr>
       </p:pic>
-      <p:sp>
-        <p:nvSpPr>
-          <p:cNvPr id="14339" name="Text Box 3"/>
-          <p:cNvSpPr txBox="1">
-            <a:spLocks noChangeArrowheads="1"/>
-          </p:cNvSpPr>
-          <p:nvPr/>
-        </p:nvSpPr>
-        <p:spPr bwMode="auto">
-          <a:xfrm>
-            <a:off x="539750" y="6092825"/>
-            <a:ext cx="6624638" cy="519113"/>
-          </a:xfrm>
-          <a:prstGeom prst="rect">
-            <a:avLst/>
-          </a:prstGeom>
-          <a:noFill/>
-          <a:ln w="9525">
-            <a:noFill/>
-            <a:miter lim="800000"/>
-            <a:headEnd/>
-            <a:tailEnd/>
-          </a:ln>
-          <a:effectLst/>
-        </p:spPr>
-        <p:txBody>
-          <a:bodyPr>
-            <a:spAutoFit/>
-          </a:bodyPr>
-          <a:lstStyle/>
-          <a:p>
-            <a:pPr>
-              <a:spcBef>
-                <a:spcPct val="50000"/>
-              </a:spcBef>
-            </a:pPr>
-            <a:r>
-              <a:rPr lang="th-TH"/>
-              <a:t>แสดงผลลัพท์</a:t>
-            </a:r>
-          </a:p>
-        </p:txBody>
-      </p:sp>
     </p:spTree>
   </p:cSld>
   <p:clrMapOvr>
@@ -6319,6 +6434,304 @@
           <a:effectLst/>
         </p:spPr>
       </p:pic>
+    </p:spTree>
+  </p:cSld>
+  <p:clrMapOvr>
+    <a:masterClrMapping/>
+  </p:clrMapOvr>
+</p:sld>
+</file>
+
+<file path=ppt/slides/slide40.xml><?xml version="1.0" encoding="utf-8"?>
+<p:sld xmlns:a="http://schemas.openxmlformats.org/drawingml/2006/main" xmlns:r="http://schemas.openxmlformats.org/officeDocument/2006/relationships" xmlns:p="http://schemas.openxmlformats.org/presentationml/2006/main">
+  <p:cSld>
+    <p:spTree>
+      <p:nvGrpSpPr>
+        <p:cNvPr id="1" name=""/>
+        <p:cNvGrpSpPr/>
+        <p:nvPr/>
+      </p:nvGrpSpPr>
+      <p:grpSpPr>
+        <a:xfrm>
+          <a:off x="0" y="0"/>
+          <a:ext cx="0" cy="0"/>
+          <a:chOff x="0" y="0"/>
+          <a:chExt cx="0" cy="0"/>
+        </a:xfrm>
+      </p:grpSpPr>
+      <p:pic>
+        <p:nvPicPr>
+          <p:cNvPr id="22532" name="Picture 4"/>
+          <p:cNvPicPr>
+            <a:picLocks noChangeAspect="1" noChangeArrowheads="1"/>
+          </p:cNvPicPr>
+          <p:nvPr/>
+        </p:nvPicPr>
+        <p:blipFill>
+          <a:blip r:embed="rId2"/>
+          <a:srcRect/>
+          <a:stretch>
+            <a:fillRect/>
+          </a:stretch>
+        </p:blipFill>
+        <p:spPr bwMode="auto">
+          <a:xfrm>
+            <a:off x="2484438" y="1341438"/>
+            <a:ext cx="4838700" cy="5057775"/>
+          </a:xfrm>
+          <a:prstGeom prst="rect">
+            <a:avLst/>
+          </a:prstGeom>
+          <a:noFill/>
+          <a:ln w="9525">
+            <a:noFill/>
+            <a:miter lim="800000"/>
+            <a:headEnd/>
+            <a:tailEnd/>
+          </a:ln>
+          <a:effectLst/>
+        </p:spPr>
+      </p:pic>
+      <p:sp>
+        <p:nvSpPr>
+          <p:cNvPr id="22533" name="Text Box 5"/>
+          <p:cNvSpPr txBox="1">
+            <a:spLocks noChangeArrowheads="1"/>
+          </p:cNvSpPr>
+          <p:nvPr/>
+        </p:nvSpPr>
+        <p:spPr bwMode="auto">
+          <a:xfrm>
+            <a:off x="611188" y="476250"/>
+            <a:ext cx="5832475" cy="519113"/>
+          </a:xfrm>
+          <a:prstGeom prst="rect">
+            <a:avLst/>
+          </a:prstGeom>
+          <a:noFill/>
+          <a:ln w="9525">
+            <a:noFill/>
+            <a:miter lim="800000"/>
+            <a:headEnd/>
+            <a:tailEnd/>
+          </a:ln>
+          <a:effectLst/>
+        </p:spPr>
+        <p:txBody>
+          <a:bodyPr>
+            <a:spAutoFit/>
+          </a:bodyPr>
+          <a:lstStyle/>
+          <a:p>
+            <a:pPr>
+              <a:spcBef>
+                <a:spcPct val="50000"/>
+              </a:spcBef>
+            </a:pPr>
+            <a:r>
+              <a:rPr lang="th-TH"/>
+              <a:t>วิธีการหา </a:t>
+            </a:r>
+            <a:r>
+              <a:rPr lang="en-US"/>
+              <a:t>Breadth first traversal tree</a:t>
+            </a:r>
+            <a:endParaRPr lang="th-TH"/>
+          </a:p>
+        </p:txBody>
+      </p:sp>
+    </p:spTree>
+  </p:cSld>
+  <p:clrMapOvr>
+    <a:masterClrMapping/>
+  </p:clrMapOvr>
+</p:sld>
+</file>
+
+<file path=ppt/slides/slide41.xml><?xml version="1.0" encoding="utf-8"?>
+<p:sld xmlns:a="http://schemas.openxmlformats.org/drawingml/2006/main" xmlns:r="http://schemas.openxmlformats.org/officeDocument/2006/relationships" xmlns:p="http://schemas.openxmlformats.org/presentationml/2006/main">
+  <p:cSld>
+    <p:spTree>
+      <p:nvGrpSpPr>
+        <p:cNvPr id="1" name=""/>
+        <p:cNvGrpSpPr/>
+        <p:nvPr/>
+      </p:nvGrpSpPr>
+      <p:grpSpPr>
+        <a:xfrm>
+          <a:off x="0" y="0"/>
+          <a:ext cx="0" cy="0"/>
+          <a:chOff x="0" y="0"/>
+          <a:chExt cx="0" cy="0"/>
+        </a:xfrm>
+      </p:grpSpPr>
+      <p:pic>
+        <p:nvPicPr>
+          <p:cNvPr id="15363" name="Picture 3"/>
+          <p:cNvPicPr>
+            <a:picLocks noChangeAspect="1" noChangeArrowheads="1"/>
+          </p:cNvPicPr>
+          <p:nvPr/>
+        </p:nvPicPr>
+        <p:blipFill>
+          <a:blip r:embed="rId2"/>
+          <a:srcRect/>
+          <a:stretch>
+            <a:fillRect/>
+          </a:stretch>
+        </p:blipFill>
+        <p:spPr bwMode="auto">
+          <a:xfrm>
+            <a:off x="1908175" y="692150"/>
+            <a:ext cx="4838700" cy="5057775"/>
+          </a:xfrm>
+          <a:prstGeom prst="rect">
+            <a:avLst/>
+          </a:prstGeom>
+          <a:noFill/>
+          <a:ln w="9525">
+            <a:noFill/>
+            <a:miter lim="800000"/>
+            <a:headEnd/>
+            <a:tailEnd/>
+          </a:ln>
+          <a:effectLst/>
+        </p:spPr>
+      </p:pic>
+      <p:pic>
+        <p:nvPicPr>
+          <p:cNvPr id="15362" name="Picture 2"/>
+          <p:cNvPicPr>
+            <a:picLocks noChangeAspect="1" noChangeArrowheads="1"/>
+          </p:cNvPicPr>
+          <p:nvPr/>
+        </p:nvPicPr>
+        <p:blipFill>
+          <a:blip r:embed="rId3"/>
+          <a:srcRect/>
+          <a:stretch>
+            <a:fillRect/>
+          </a:stretch>
+        </p:blipFill>
+        <p:spPr bwMode="auto">
+          <a:xfrm>
+            <a:off x="5076825" y="1196975"/>
+            <a:ext cx="1981200" cy="1276350"/>
+          </a:xfrm>
+          <a:prstGeom prst="rect">
+            <a:avLst/>
+          </a:prstGeom>
+          <a:noFill/>
+          <a:ln w="9525">
+            <a:noFill/>
+            <a:miter lim="800000"/>
+            <a:headEnd/>
+            <a:tailEnd/>
+          </a:ln>
+          <a:effectLst/>
+        </p:spPr>
+      </p:pic>
+    </p:spTree>
+  </p:cSld>
+  <p:clrMapOvr>
+    <a:masterClrMapping/>
+  </p:clrMapOvr>
+</p:sld>
+</file>
+
+<file path=ppt/slides/slide42.xml><?xml version="1.0" encoding="utf-8"?>
+<p:sld xmlns:a="http://schemas.openxmlformats.org/drawingml/2006/main" xmlns:r="http://schemas.openxmlformats.org/officeDocument/2006/relationships" xmlns:p="http://schemas.openxmlformats.org/presentationml/2006/main">
+  <p:cSld>
+    <p:spTree>
+      <p:nvGrpSpPr>
+        <p:cNvPr id="1" name=""/>
+        <p:cNvGrpSpPr/>
+        <p:nvPr/>
+      </p:nvGrpSpPr>
+      <p:grpSpPr>
+        <a:xfrm>
+          <a:off x="0" y="0"/>
+          <a:ext cx="0" cy="0"/>
+          <a:chOff x="0" y="0"/>
+          <a:chExt cx="0" cy="0"/>
+        </a:xfrm>
+      </p:grpSpPr>
+      <p:pic>
+        <p:nvPicPr>
+          <p:cNvPr id="14338" name="Picture 2"/>
+          <p:cNvPicPr>
+            <a:picLocks noChangeAspect="1" noChangeArrowheads="1"/>
+          </p:cNvPicPr>
+          <p:nvPr/>
+        </p:nvPicPr>
+        <p:blipFill>
+          <a:blip r:embed="rId2"/>
+          <a:srcRect/>
+          <a:stretch>
+            <a:fillRect/>
+          </a:stretch>
+        </p:blipFill>
+        <p:spPr bwMode="auto">
+          <a:xfrm>
+            <a:off x="2152650" y="900113"/>
+            <a:ext cx="4838700" cy="5057775"/>
+          </a:xfrm>
+          <a:prstGeom prst="rect">
+            <a:avLst/>
+          </a:prstGeom>
+          <a:noFill/>
+          <a:ln w="9525">
+            <a:noFill/>
+            <a:miter lim="800000"/>
+            <a:headEnd/>
+            <a:tailEnd/>
+          </a:ln>
+          <a:effectLst/>
+        </p:spPr>
+      </p:pic>
+      <p:sp>
+        <p:nvSpPr>
+          <p:cNvPr id="14339" name="Text Box 3"/>
+          <p:cNvSpPr txBox="1">
+            <a:spLocks noChangeArrowheads="1"/>
+          </p:cNvSpPr>
+          <p:nvPr/>
+        </p:nvSpPr>
+        <p:spPr bwMode="auto">
+          <a:xfrm>
+            <a:off x="539750" y="6092825"/>
+            <a:ext cx="6624638" cy="519113"/>
+          </a:xfrm>
+          <a:prstGeom prst="rect">
+            <a:avLst/>
+          </a:prstGeom>
+          <a:noFill/>
+          <a:ln w="9525">
+            <a:noFill/>
+            <a:miter lim="800000"/>
+            <a:headEnd/>
+            <a:tailEnd/>
+          </a:ln>
+          <a:effectLst/>
+        </p:spPr>
+        <p:txBody>
+          <a:bodyPr>
+            <a:spAutoFit/>
+          </a:bodyPr>
+          <a:lstStyle/>
+          <a:p>
+            <a:pPr>
+              <a:spcBef>
+                <a:spcPct val="50000"/>
+              </a:spcBef>
+            </a:pPr>
+            <a:r>
+              <a:rPr lang="th-TH"/>
+              <a:t>แสดงผลลัพท์</a:t>
+            </a:r>
+          </a:p>
+        </p:txBody>
+      </p:sp>
     </p:spTree>
   </p:cSld>
   <p:clrMapOvr>

</xml_diff>